<commit_message>
Standard LoRA & Update All Results
</commit_message>
<xml_diff>
--- a/Class_Incremental_CL/Classif_Bi_Dir_GRU_Model/Result_Organization/Current_Exp_Result_20250418.pptx
+++ b/Class_Incremental_CL/Classif_Bi_Dir_GRU_Model/Result_Organization/Current_Exp_Result_20250418.pptx
@@ -7,11 +7,11 @@
   <p:sldIdLst>
     <p:sldId id="256" r:id="rId2"/>
     <p:sldId id="257" r:id="rId3"/>
-    <p:sldId id="258" r:id="rId4"/>
-    <p:sldId id="259" r:id="rId5"/>
-    <p:sldId id="260" r:id="rId6"/>
-    <p:sldId id="261" r:id="rId7"/>
-    <p:sldId id="262" r:id="rId8"/>
+    <p:sldId id="259" r:id="rId4"/>
+    <p:sldId id="260" r:id="rId5"/>
+    <p:sldId id="261" r:id="rId6"/>
+    <p:sldId id="262" r:id="rId7"/>
+    <p:sldId id="263" r:id="rId8"/>
   </p:sldIdLst>
   <p:sldSz cx="12192000" cy="6858000"/>
   <p:notesSz cx="6858000" cy="9144000"/>
@@ -265,7 +265,7 @@
           <a:p>
             <a:fld id="{ACB3C616-C29C-4CB5-BBBF-B4A138EC92CF}" type="datetimeFigureOut">
               <a:rPr lang="zh-TW" altLang="en-US" smtClean="0"/>
-              <a:t>2025/4/20</a:t>
+              <a:t>2025/4/21</a:t>
             </a:fld>
             <a:endParaRPr lang="zh-TW" altLang="en-US"/>
           </a:p>
@@ -463,7 +463,7 @@
           <a:p>
             <a:fld id="{ACB3C616-C29C-4CB5-BBBF-B4A138EC92CF}" type="datetimeFigureOut">
               <a:rPr lang="zh-TW" altLang="en-US" smtClean="0"/>
-              <a:t>2025/4/20</a:t>
+              <a:t>2025/4/21</a:t>
             </a:fld>
             <a:endParaRPr lang="zh-TW" altLang="en-US"/>
           </a:p>
@@ -671,7 +671,7 @@
           <a:p>
             <a:fld id="{ACB3C616-C29C-4CB5-BBBF-B4A138EC92CF}" type="datetimeFigureOut">
               <a:rPr lang="zh-TW" altLang="en-US" smtClean="0"/>
-              <a:t>2025/4/20</a:t>
+              <a:t>2025/4/21</a:t>
             </a:fld>
             <a:endParaRPr lang="zh-TW" altLang="en-US"/>
           </a:p>
@@ -869,7 +869,7 @@
           <a:p>
             <a:fld id="{ACB3C616-C29C-4CB5-BBBF-B4A138EC92CF}" type="datetimeFigureOut">
               <a:rPr lang="zh-TW" altLang="en-US" smtClean="0"/>
-              <a:t>2025/4/20</a:t>
+              <a:t>2025/4/21</a:t>
             </a:fld>
             <a:endParaRPr lang="zh-TW" altLang="en-US"/>
           </a:p>
@@ -1144,7 +1144,7 @@
           <a:p>
             <a:fld id="{ACB3C616-C29C-4CB5-BBBF-B4A138EC92CF}" type="datetimeFigureOut">
               <a:rPr lang="zh-TW" altLang="en-US" smtClean="0"/>
-              <a:t>2025/4/20</a:t>
+              <a:t>2025/4/21</a:t>
             </a:fld>
             <a:endParaRPr lang="zh-TW" altLang="en-US"/>
           </a:p>
@@ -1409,7 +1409,7 @@
           <a:p>
             <a:fld id="{ACB3C616-C29C-4CB5-BBBF-B4A138EC92CF}" type="datetimeFigureOut">
               <a:rPr lang="zh-TW" altLang="en-US" smtClean="0"/>
-              <a:t>2025/4/20</a:t>
+              <a:t>2025/4/21</a:t>
             </a:fld>
             <a:endParaRPr lang="zh-TW" altLang="en-US"/>
           </a:p>
@@ -1821,7 +1821,7 @@
           <a:p>
             <a:fld id="{ACB3C616-C29C-4CB5-BBBF-B4A138EC92CF}" type="datetimeFigureOut">
               <a:rPr lang="zh-TW" altLang="en-US" smtClean="0"/>
-              <a:t>2025/4/20</a:t>
+              <a:t>2025/4/21</a:t>
             </a:fld>
             <a:endParaRPr lang="zh-TW" altLang="en-US"/>
           </a:p>
@@ -1962,7 +1962,7 @@
           <a:p>
             <a:fld id="{ACB3C616-C29C-4CB5-BBBF-B4A138EC92CF}" type="datetimeFigureOut">
               <a:rPr lang="zh-TW" altLang="en-US" smtClean="0"/>
-              <a:t>2025/4/20</a:t>
+              <a:t>2025/4/21</a:t>
             </a:fld>
             <a:endParaRPr lang="zh-TW" altLang="en-US"/>
           </a:p>
@@ -2075,7 +2075,7 @@
           <a:p>
             <a:fld id="{ACB3C616-C29C-4CB5-BBBF-B4A138EC92CF}" type="datetimeFigureOut">
               <a:rPr lang="zh-TW" altLang="en-US" smtClean="0"/>
-              <a:t>2025/4/20</a:t>
+              <a:t>2025/4/21</a:t>
             </a:fld>
             <a:endParaRPr lang="zh-TW" altLang="en-US"/>
           </a:p>
@@ -2386,7 +2386,7 @@
           <a:p>
             <a:fld id="{ACB3C616-C29C-4CB5-BBBF-B4A138EC92CF}" type="datetimeFigureOut">
               <a:rPr lang="zh-TW" altLang="en-US" smtClean="0"/>
-              <a:t>2025/4/20</a:t>
+              <a:t>2025/4/21</a:t>
             </a:fld>
             <a:endParaRPr lang="zh-TW" altLang="en-US"/>
           </a:p>
@@ -2674,7 +2674,7 @@
           <a:p>
             <a:fld id="{ACB3C616-C29C-4CB5-BBBF-B4A138EC92CF}" type="datetimeFigureOut">
               <a:rPr lang="zh-TW" altLang="en-US" smtClean="0"/>
-              <a:t>2025/4/20</a:t>
+              <a:t>2025/4/21</a:t>
             </a:fld>
             <a:endParaRPr lang="zh-TW" altLang="en-US"/>
           </a:p>
@@ -2915,7 +2915,7 @@
           <a:p>
             <a:fld id="{ACB3C616-C29C-4CB5-BBBF-B4A138EC92CF}" type="datetimeFigureOut">
               <a:rPr lang="zh-TW" altLang="en-US" smtClean="0"/>
-              <a:t>2025/4/20</a:t>
+              <a:t>2025/4/21</a:t>
             </a:fld>
             <a:endParaRPr lang="zh-TW" altLang="en-US"/>
           </a:p>
@@ -4674,13 +4674,8 @@
             <a:pPr algn="ctr"/>
             <a:r>
               <a:rPr lang="zh-TW" altLang="en-US" b="1" dirty="0"/>
-              <a:t>PNN_CL_Classif_Bi_Dir_GRU_Model.ipynb </a:t>
+              <a:t>PNN_CL_Classif_Bi_Dir_GRU_Model.ipynb</a:t>
             </a:r>
-            <a:r>
-              <a:rPr lang="en-US" altLang="zh-TW" b="1" dirty="0"/>
-              <a:t>(update)</a:t>
-            </a:r>
-            <a:endParaRPr lang="zh-TW" altLang="en-US" b="1" dirty="0"/>
           </a:p>
         </p:txBody>
       </p:sp>
@@ -6064,7 +6059,7 @@
             <a:pPr algn="ctr"/>
             <a:r>
               <a:rPr lang="en-US" altLang="zh-TW" b="1" dirty="0"/>
-              <a:t>MSE_Distillation_CIL_Classif_Bi_Dir_GRU_Model.ipynb (update)</a:t>
+              <a:t>MSE_Distillation_CIL_Classif_Bi_Dir_GRU_Model.ipynb</a:t>
             </a:r>
             <a:endParaRPr lang="zh-TW" altLang="en-US" b="1" dirty="0"/>
           </a:p>
@@ -6084,1394 +6079,6 @@
 </file>
 
 <file path=ppt/slides/slide3.xml><?xml version="1.0" encoding="utf-8"?>
-<p:sld xmlns:a="http://schemas.openxmlformats.org/drawingml/2006/main" xmlns:r="http://schemas.openxmlformats.org/officeDocument/2006/relationships" xmlns:p="http://schemas.openxmlformats.org/presentationml/2006/main">
-  <p:cSld>
-    <p:spTree>
-      <p:nvGrpSpPr>
-        <p:cNvPr id="1" name=""/>
-        <p:cNvGrpSpPr/>
-        <p:nvPr/>
-      </p:nvGrpSpPr>
-      <p:grpSpPr>
-        <a:xfrm>
-          <a:off x="0" y="0"/>
-          <a:ext cx="0" cy="0"/>
-          <a:chOff x="0" y="0"/>
-          <a:chExt cx="0" cy="0"/>
-        </a:xfrm>
-      </p:grpSpPr>
-      <p:graphicFrame>
-        <p:nvGraphicFramePr>
-          <p:cNvPr id="4" name="表格 3">
-            <a:extLst>
-              <a:ext uri="{FF2B5EF4-FFF2-40B4-BE49-F238E27FC236}">
-                <a16:creationId xmlns:a16="http://schemas.microsoft.com/office/drawing/2014/main" id="{60FA53F5-A086-44D4-9DBD-72749E825970}"/>
-              </a:ext>
-            </a:extLst>
-          </p:cNvPr>
-          <p:cNvGraphicFramePr>
-            <a:graphicFrameLocks noGrp="1"/>
-          </p:cNvGraphicFramePr>
-          <p:nvPr>
-            <p:extLst>
-              <p:ext uri="{D42A27DB-BD31-4B8C-83A1-F6EECF244321}">
-                <p14:modId xmlns:p14="http://schemas.microsoft.com/office/powerpoint/2010/main" val="985615294"/>
-              </p:ext>
-            </p:extLst>
-          </p:nvPr>
-        </p:nvGraphicFramePr>
-        <p:xfrm>
-          <a:off x="1784162" y="2216467"/>
-          <a:ext cx="8623676" cy="2607945"/>
-        </p:xfrm>
-        <a:graphic>
-          <a:graphicData uri="http://schemas.openxmlformats.org/drawingml/2006/table">
-            <a:tbl>
-              <a:tblPr firstRow="1">
-                <a:tableStyleId>{9D7B26C5-4107-4FEC-AEDC-1716B250A1EF}</a:tableStyleId>
-              </a:tblPr>
-              <a:tblGrid>
-                <a:gridCol w="838200">
-                  <a:extLst>
-                    <a:ext uri="{9D8B030D-6E8A-4147-A177-3AD203B41FA5}">
-                      <a16:colId xmlns:a16="http://schemas.microsoft.com/office/drawing/2014/main" val="3286517438"/>
-                    </a:ext>
-                  </a:extLst>
-                </a:gridCol>
-                <a:gridCol w="2914650">
-                  <a:extLst>
-                    <a:ext uri="{9D8B030D-6E8A-4147-A177-3AD203B41FA5}">
-                      <a16:colId xmlns:a16="http://schemas.microsoft.com/office/drawing/2014/main" val="1094686977"/>
-                    </a:ext>
-                  </a:extLst>
-                </a:gridCol>
-                <a:gridCol w="1181100">
-                  <a:extLst>
-                    <a:ext uri="{9D8B030D-6E8A-4147-A177-3AD203B41FA5}">
-                      <a16:colId xmlns:a16="http://schemas.microsoft.com/office/drawing/2014/main" val="218855835"/>
-                    </a:ext>
-                  </a:extLst>
-                </a:gridCol>
-                <a:gridCol w="3689726">
-                  <a:extLst>
-                    <a:ext uri="{9D8B030D-6E8A-4147-A177-3AD203B41FA5}">
-                      <a16:colId xmlns:a16="http://schemas.microsoft.com/office/drawing/2014/main" val="3780893304"/>
-                    </a:ext>
-                  </a:extLst>
-                </a:gridCol>
-              </a:tblGrid>
-              <a:tr h="209550">
-                <a:tc>
-                  <a:txBody>
-                    <a:bodyPr/>
-                    <a:lstStyle/>
-                    <a:p>
-                      <a:pPr algn="ctr" fontAlgn="ctr"/>
-                      <a:r>
-                        <a:rPr lang="en-US" sz="1200" b="1" u="none" strike="noStrike" dirty="0">
-                          <a:solidFill>
-                            <a:srgbClr val="000000"/>
-                          </a:solidFill>
-                          <a:effectLst/>
-                          <a:latin typeface="+mn-lt"/>
-                        </a:rPr>
-                        <a:t>Period</a:t>
-                      </a:r>
-                      <a:endParaRPr lang="en-US" sz="1200" b="1" i="0" u="none" strike="noStrike" dirty="0">
-                        <a:solidFill>
-                          <a:srgbClr val="000000"/>
-                        </a:solidFill>
-                        <a:effectLst/>
-                        <a:latin typeface="+mn-lt"/>
-                        <a:ea typeface="新細明體" panose="02020500000000000000" pitchFamily="18" charset="-120"/>
-                      </a:endParaRPr>
-                    </a:p>
-                  </a:txBody>
-                  <a:tcPr marL="9525" marR="9525" marT="9525" marB="0" anchor="ctr"/>
-                </a:tc>
-                <a:tc>
-                  <a:txBody>
-                    <a:bodyPr/>
-                    <a:lstStyle/>
-                    <a:p>
-                      <a:pPr algn="ctr" fontAlgn="ctr"/>
-                      <a:r>
-                        <a:rPr lang="en-US" sz="1200" b="1" u="none" strike="noStrike" dirty="0">
-                          <a:solidFill>
-                            <a:srgbClr val="000000"/>
-                          </a:solidFill>
-                          <a:effectLst/>
-                          <a:latin typeface="+mn-lt"/>
-                        </a:rPr>
-                        <a:t>Model &amp; Config</a:t>
-                      </a:r>
-                      <a:endParaRPr lang="en-US" sz="1200" b="1" i="0" u="none" strike="noStrike" dirty="0">
-                        <a:solidFill>
-                          <a:srgbClr val="000000"/>
-                        </a:solidFill>
-                        <a:effectLst/>
-                        <a:latin typeface="+mn-lt"/>
-                        <a:ea typeface="新細明體" panose="02020500000000000000" pitchFamily="18" charset="-120"/>
-                      </a:endParaRPr>
-                    </a:p>
-                  </a:txBody>
-                  <a:tcPr marL="9525" marR="9525" marT="9525" marB="0" anchor="ctr"/>
-                </a:tc>
-                <a:tc>
-                  <a:txBody>
-                    <a:bodyPr/>
-                    <a:lstStyle/>
-                    <a:p>
-                      <a:pPr algn="ctr" fontAlgn="ctr"/>
-                      <a:r>
-                        <a:rPr lang="en-US" sz="1200" b="1" u="none" strike="noStrike" dirty="0">
-                          <a:solidFill>
-                            <a:srgbClr val="000000"/>
-                          </a:solidFill>
-                          <a:effectLst/>
-                          <a:latin typeface="+mn-lt"/>
-                        </a:rPr>
-                        <a:t>Validation Accuracy (%)</a:t>
-                      </a:r>
-                      <a:endParaRPr lang="en-US" sz="1200" b="1" i="0" u="none" strike="noStrike" dirty="0">
-                        <a:solidFill>
-                          <a:srgbClr val="000000"/>
-                        </a:solidFill>
-                        <a:effectLst/>
-                        <a:latin typeface="+mn-lt"/>
-                        <a:ea typeface="新細明體" panose="02020500000000000000" pitchFamily="18" charset="-120"/>
-                      </a:endParaRPr>
-                    </a:p>
-                  </a:txBody>
-                  <a:tcPr marL="9525" marR="9525" marT="9525" marB="0" anchor="ctr"/>
-                </a:tc>
-                <a:tc>
-                  <a:txBody>
-                    <a:bodyPr/>
-                    <a:lstStyle/>
-                    <a:p>
-                      <a:pPr algn="ctr" fontAlgn="ctr"/>
-                      <a:r>
-                        <a:rPr lang="en-US" sz="1200" b="1" u="none" strike="noStrike" dirty="0">
-                          <a:solidFill>
-                            <a:srgbClr val="000000"/>
-                          </a:solidFill>
-                          <a:effectLst/>
-                          <a:latin typeface="+mn-lt"/>
-                        </a:rPr>
-                        <a:t>Class-wise Accuracy</a:t>
-                      </a:r>
-                      <a:endParaRPr lang="en-US" sz="1200" b="1" i="0" u="none" strike="noStrike" dirty="0">
-                        <a:solidFill>
-                          <a:srgbClr val="000000"/>
-                        </a:solidFill>
-                        <a:effectLst/>
-                        <a:latin typeface="+mn-lt"/>
-                        <a:ea typeface="新細明體" panose="02020500000000000000" pitchFamily="18" charset="-120"/>
-                      </a:endParaRPr>
-                    </a:p>
-                  </a:txBody>
-                  <a:tcPr marL="9525" marR="9525" marT="9525" marB="0" anchor="ctr"/>
-                </a:tc>
-                <a:extLst>
-                  <a:ext uri="{0D108BD9-81ED-4DB2-BD59-A6C34878D82A}">
-                    <a16:rowId xmlns:a16="http://schemas.microsoft.com/office/drawing/2014/main" val="2296710376"/>
-                  </a:ext>
-                </a:extLst>
-              </a:tr>
-              <a:tr h="209550">
-                <a:tc>
-                  <a:txBody>
-                    <a:bodyPr/>
-                    <a:lstStyle/>
-                    <a:p>
-                      <a:pPr algn="ctr" fontAlgn="ctr"/>
-                      <a:r>
-                        <a:rPr lang="en-US" altLang="zh-TW" sz="1200" b="1" u="none" strike="noStrike" dirty="0">
-                          <a:solidFill>
-                            <a:srgbClr val="000000"/>
-                          </a:solidFill>
-                          <a:effectLst/>
-                          <a:latin typeface="+mn-lt"/>
-                        </a:rPr>
-                        <a:t>1</a:t>
-                      </a:r>
-                      <a:endParaRPr lang="en-US" altLang="zh-TW" sz="1200" b="1" i="0" u="none" strike="noStrike" dirty="0">
-                        <a:solidFill>
-                          <a:srgbClr val="000000"/>
-                        </a:solidFill>
-                        <a:effectLst/>
-                        <a:latin typeface="+mn-lt"/>
-                        <a:ea typeface="新細明體" panose="02020500000000000000" pitchFamily="18" charset="-120"/>
-                      </a:endParaRPr>
-                    </a:p>
-                  </a:txBody>
-                  <a:tcPr marL="9525" marR="9525" marT="9525" marB="0" anchor="ctr">
-                    <a:lnB w="12700" cap="flat" cmpd="sng" algn="ctr">
-                      <a:solidFill>
-                        <a:schemeClr val="tx1"/>
-                      </a:solidFill>
-                      <a:prstDash val="solid"/>
-                      <a:round/>
-                      <a:headEnd type="none" w="med" len="med"/>
-                      <a:tailEnd type="none" w="med" len="med"/>
-                    </a:lnB>
-                  </a:tcPr>
-                </a:tc>
-                <a:tc>
-                  <a:txBody>
-                    <a:bodyPr/>
-                    <a:lstStyle/>
-                    <a:p>
-                      <a:pPr algn="ctr" fontAlgn="ctr"/>
-                      <a:r>
-                        <a:rPr lang="en-US" altLang="zh-TW" sz="1200" b="1" u="none" strike="noStrike" dirty="0">
-                          <a:solidFill>
-                            <a:srgbClr val="000000"/>
-                          </a:solidFill>
-                          <a:effectLst/>
-                          <a:latin typeface="+mn-lt"/>
-                        </a:rPr>
-                        <a:t>BiGRUWithAttention</a:t>
-                      </a:r>
-                    </a:p>
-                    <a:p>
-                      <a:pPr algn="ctr" fontAlgn="ctr"/>
-                      <a:r>
-                        <a:rPr lang="en-US" altLang="zh-TW" sz="1200" b="1" i="0" u="none" strike="noStrike" dirty="0">
-                          <a:solidFill>
-                            <a:srgbClr val="000000"/>
-                          </a:solidFill>
-                          <a:effectLst/>
-                          <a:latin typeface="+mn-lt"/>
-                          <a:ea typeface="+mn-ea"/>
-                        </a:rPr>
-                        <a:t>(num_layers=4)</a:t>
-                      </a:r>
-                    </a:p>
-                    <a:p>
-                      <a:pPr algn="ctr" fontAlgn="ctr"/>
-                      <a:r>
-                        <a:rPr lang="en-US" altLang="zh-TW" sz="1200" b="1" i="0" u="none" strike="noStrike" dirty="0">
-                          <a:solidFill>
-                            <a:srgbClr val="000000"/>
-                          </a:solidFill>
-                          <a:effectLst/>
-                          <a:latin typeface="+mn-lt"/>
-                          <a:ea typeface="+mn-ea"/>
-                        </a:rPr>
-                        <a:t>saved in '1st_try'</a:t>
-                      </a:r>
-                      <a:endParaRPr lang="en-US" altLang="zh-TW" sz="1200" b="1" i="0" u="none" strike="noStrike" dirty="0">
-                        <a:solidFill>
-                          <a:srgbClr val="000000"/>
-                        </a:solidFill>
-                        <a:effectLst/>
-                        <a:latin typeface="+mn-lt"/>
-                        <a:ea typeface="新細明體" panose="02020500000000000000" pitchFamily="18" charset="-120"/>
-                      </a:endParaRPr>
-                    </a:p>
-                  </a:txBody>
-                  <a:tcPr marL="9525" marR="9525" marT="9525" marB="0" anchor="ctr">
-                    <a:lnB w="12700" cap="flat" cmpd="sng" algn="ctr">
-                      <a:solidFill>
-                        <a:schemeClr val="tx1"/>
-                      </a:solidFill>
-                      <a:prstDash val="solid"/>
-                      <a:round/>
-                      <a:headEnd type="none" w="med" len="med"/>
-                      <a:tailEnd type="none" w="med" len="med"/>
-                    </a:lnB>
-                  </a:tcPr>
-                </a:tc>
-                <a:tc>
-                  <a:txBody>
-                    <a:bodyPr/>
-                    <a:lstStyle/>
-                    <a:p>
-                      <a:pPr algn="ctr" fontAlgn="ctr"/>
-                      <a:r>
-                        <a:rPr lang="en-US" altLang="zh-TW" sz="1200" b="1" u="none" strike="noStrike" dirty="0">
-                          <a:solidFill>
-                            <a:srgbClr val="000000"/>
-                          </a:solidFill>
-                          <a:effectLst/>
-                          <a:latin typeface="+mn-lt"/>
-                        </a:rPr>
-                        <a:t>98.35</a:t>
-                      </a:r>
-                    </a:p>
-                  </a:txBody>
-                  <a:tcPr marL="9525" marR="9525" marT="9525" marB="0" anchor="ctr">
-                    <a:lnB w="12700" cap="flat" cmpd="sng" algn="ctr">
-                      <a:solidFill>
-                        <a:schemeClr val="tx1"/>
-                      </a:solidFill>
-                      <a:prstDash val="solid"/>
-                      <a:round/>
-                      <a:headEnd type="none" w="med" len="med"/>
-                      <a:tailEnd type="none" w="med" len="med"/>
-                    </a:lnB>
-                  </a:tcPr>
-                </a:tc>
-                <a:tc>
-                  <a:txBody>
-                    <a:bodyPr/>
-                    <a:lstStyle/>
-                    <a:p>
-                      <a:pPr algn="l" fontAlgn="ctr"/>
-                      <a:r>
-                        <a:rPr lang="en-US" altLang="zh-TW" sz="1200" b="1" u="none" strike="noStrike" dirty="0">
-                          <a:solidFill>
-                            <a:srgbClr val="000000"/>
-                          </a:solidFill>
-                          <a:effectLst/>
-                          <a:latin typeface="+mn-lt"/>
-                        </a:rPr>
-                        <a:t>{0: 98.10%, 1: 97.81%}</a:t>
-                      </a:r>
-                    </a:p>
-                  </a:txBody>
-                  <a:tcPr marL="9525" marR="9525" marT="9525" marB="0" anchor="ctr">
-                    <a:lnB w="12700" cap="flat" cmpd="sng" algn="ctr">
-                      <a:solidFill>
-                        <a:schemeClr val="tx1"/>
-                      </a:solidFill>
-                      <a:prstDash val="solid"/>
-                      <a:round/>
-                      <a:headEnd type="none" w="med" len="med"/>
-                      <a:tailEnd type="none" w="med" len="med"/>
-                    </a:lnB>
-                  </a:tcPr>
-                </a:tc>
-                <a:extLst>
-                  <a:ext uri="{0D108BD9-81ED-4DB2-BD59-A6C34878D82A}">
-                    <a16:rowId xmlns:a16="http://schemas.microsoft.com/office/drawing/2014/main" val="1742789668"/>
-                  </a:ext>
-                </a:extLst>
-              </a:tr>
-              <a:tr h="209550">
-                <a:tc>
-                  <a:txBody>
-                    <a:bodyPr/>
-                    <a:lstStyle/>
-                    <a:p>
-                      <a:pPr algn="ctr" fontAlgn="ctr"/>
-                      <a:r>
-                        <a:rPr lang="en-US" altLang="zh-TW" sz="1200" b="1" i="0" u="none" strike="noStrike">
-                          <a:solidFill>
-                            <a:srgbClr val="000000"/>
-                          </a:solidFill>
-                          <a:effectLst/>
-                          <a:latin typeface="+mn-lt"/>
-                          <a:ea typeface="新細明體" panose="02020500000000000000" pitchFamily="18" charset="-120"/>
-                        </a:rPr>
-                        <a:t>2</a:t>
-                      </a:r>
-                      <a:endParaRPr lang="en-US" altLang="zh-TW" sz="1200" b="1" i="0" u="none" strike="noStrike" dirty="0">
-                        <a:solidFill>
-                          <a:srgbClr val="000000"/>
-                        </a:solidFill>
-                        <a:effectLst/>
-                        <a:latin typeface="+mn-lt"/>
-                        <a:ea typeface="新細明體" panose="02020500000000000000" pitchFamily="18" charset="-120"/>
-                      </a:endParaRPr>
-                    </a:p>
-                  </a:txBody>
-                  <a:tcPr marL="9525" marR="9525" marT="9525" marB="0" anchor="ctr">
-                    <a:lnT w="12700" cap="flat" cmpd="sng" algn="ctr">
-                      <a:solidFill>
-                        <a:schemeClr val="tx1"/>
-                      </a:solidFill>
-                      <a:prstDash val="solid"/>
-                      <a:round/>
-                      <a:headEnd type="none" w="med" len="med"/>
-                      <a:tailEnd type="none" w="med" len="med"/>
-                    </a:lnT>
-                    <a:lnB w="12700" cap="flat" cmpd="sng" algn="ctr">
-                      <a:solidFill>
-                        <a:schemeClr val="tx1"/>
-                      </a:solidFill>
-                      <a:prstDash val="solid"/>
-                      <a:round/>
-                      <a:headEnd type="none" w="med" len="med"/>
-                      <a:tailEnd type="none" w="med" len="med"/>
-                    </a:lnB>
-                  </a:tcPr>
-                </a:tc>
-                <a:tc>
-                  <a:txBody>
-                    <a:bodyPr/>
-                    <a:lstStyle/>
-                    <a:p>
-                      <a:pPr algn="ctr" fontAlgn="ctr"/>
-                      <a:r>
-                        <a:rPr lang="en-US" altLang="zh-TW" sz="1200" b="1" u="none" strike="noStrike" dirty="0">
-                          <a:solidFill>
-                            <a:srgbClr val="000000"/>
-                          </a:solidFill>
-                          <a:effectLst/>
-                          <a:latin typeface="+mn-lt"/>
-                        </a:rPr>
-                        <a:t>BiGRUWithAttentionLoRA</a:t>
-                      </a:r>
-                    </a:p>
-                    <a:p>
-                      <a:pPr algn="ctr" fontAlgn="ctr"/>
-                      <a:r>
-                        <a:rPr lang="pt-BR" altLang="zh-TW" sz="1200" b="1" u="none" strike="noStrike" dirty="0">
-                          <a:solidFill>
-                            <a:srgbClr val="000000"/>
-                          </a:solidFill>
-                          <a:effectLst/>
-                          <a:latin typeface="+mn-lt"/>
-                        </a:rPr>
-                        <a:t>(num_layers=4, lora_r=4, alpha=0.4)</a:t>
-                      </a:r>
-                    </a:p>
-                    <a:p>
-                      <a:pPr algn="ctr" fontAlgn="ctr"/>
-                      <a:r>
-                        <a:rPr lang="en-US" altLang="zh-TW" sz="1200" b="1" u="none" strike="noStrike" dirty="0">
-                          <a:solidFill>
-                            <a:srgbClr val="000000"/>
-                          </a:solidFill>
-                          <a:effectLst/>
-                          <a:latin typeface="+mn-lt"/>
-                        </a:rPr>
-                        <a:t>saved in '2nd_try'</a:t>
-                      </a:r>
-                      <a:endParaRPr lang="en-US" altLang="zh-TW" sz="1200" b="1" i="0" u="none" strike="noStrike" dirty="0">
-                        <a:solidFill>
-                          <a:srgbClr val="000000"/>
-                        </a:solidFill>
-                        <a:effectLst/>
-                        <a:latin typeface="+mn-lt"/>
-                        <a:ea typeface="+mn-ea"/>
-                      </a:endParaRPr>
-                    </a:p>
-                  </a:txBody>
-                  <a:tcPr marL="9525" marR="9525" marT="9525" marB="0" anchor="ctr">
-                    <a:lnT w="12700" cap="flat" cmpd="sng" algn="ctr">
-                      <a:solidFill>
-                        <a:schemeClr val="tx1"/>
-                      </a:solidFill>
-                      <a:prstDash val="solid"/>
-                      <a:round/>
-                      <a:headEnd type="none" w="med" len="med"/>
-                      <a:tailEnd type="none" w="med" len="med"/>
-                    </a:lnT>
-                    <a:lnB w="12700" cap="flat" cmpd="sng" algn="ctr">
-                      <a:solidFill>
-                        <a:schemeClr val="tx1"/>
-                      </a:solidFill>
-                      <a:prstDash val="solid"/>
-                      <a:round/>
-                      <a:headEnd type="none" w="med" len="med"/>
-                      <a:tailEnd type="none" w="med" len="med"/>
-                    </a:lnB>
-                  </a:tcPr>
-                </a:tc>
-                <a:tc>
-                  <a:txBody>
-                    <a:bodyPr/>
-                    <a:lstStyle/>
-                    <a:p>
-                      <a:pPr algn="ctr"/>
-                      <a:r>
-                        <a:rPr lang="en-US" altLang="zh-TW" sz="1200" b="1" kern="1200" dirty="0">
-                          <a:solidFill>
-                            <a:schemeClr val="tx1"/>
-                          </a:solidFill>
-                          <a:effectLst/>
-                          <a:latin typeface="+mn-lt"/>
-                          <a:ea typeface="+mn-ea"/>
-                          <a:cs typeface="+mn-cs"/>
-                        </a:rPr>
-                        <a:t>97.21</a:t>
-                      </a:r>
-                      <a:endParaRPr lang="zh-TW" altLang="en-US" sz="1200" b="1" kern="1200" dirty="0">
-                        <a:solidFill>
-                          <a:schemeClr val="tx1"/>
-                        </a:solidFill>
-                        <a:effectLst/>
-                        <a:latin typeface="+mn-lt"/>
-                        <a:ea typeface="+mn-ea"/>
-                        <a:cs typeface="+mn-cs"/>
-                      </a:endParaRPr>
-                    </a:p>
-                  </a:txBody>
-                  <a:tcPr marL="9525" marR="9525" marT="9525" marB="0" anchor="ctr">
-                    <a:lnT w="12700" cap="flat" cmpd="sng" algn="ctr">
-                      <a:solidFill>
-                        <a:schemeClr val="tx1"/>
-                      </a:solidFill>
-                      <a:prstDash val="solid"/>
-                      <a:round/>
-                      <a:headEnd type="none" w="med" len="med"/>
-                      <a:tailEnd type="none" w="med" len="med"/>
-                    </a:lnT>
-                    <a:lnB w="12700" cap="flat" cmpd="sng" algn="ctr">
-                      <a:solidFill>
-                        <a:schemeClr val="tx1"/>
-                      </a:solidFill>
-                      <a:prstDash val="solid"/>
-                      <a:round/>
-                      <a:headEnd type="none" w="med" len="med"/>
-                      <a:tailEnd type="none" w="med" len="med"/>
-                    </a:lnB>
-                  </a:tcPr>
-                </a:tc>
-                <a:tc>
-                  <a:txBody>
-                    <a:bodyPr/>
-                    <a:lstStyle/>
-                    <a:p>
-                      <a:pPr algn="l"/>
-                      <a:r>
-                        <a:rPr lang="en-US" altLang="zh-TW" sz="1200" b="1" kern="1200" dirty="0">
-                          <a:solidFill>
-                            <a:schemeClr val="tx1"/>
-                          </a:solidFill>
-                          <a:effectLst/>
-                          <a:latin typeface="+mn-lt"/>
-                          <a:ea typeface="+mn-ea"/>
-                          <a:cs typeface="+mn-cs"/>
-                        </a:rPr>
-                        <a:t>{0: 99.68%, 1: 96.17%, 2: 85.94%} </a:t>
-                      </a:r>
-                      <a:endParaRPr lang="zh-TW" altLang="en-US" sz="1200" b="1" kern="1200" dirty="0">
-                        <a:solidFill>
-                          <a:schemeClr val="tx1"/>
-                        </a:solidFill>
-                        <a:effectLst/>
-                        <a:latin typeface="+mn-lt"/>
-                        <a:ea typeface="+mn-ea"/>
-                        <a:cs typeface="+mn-cs"/>
-                      </a:endParaRPr>
-                    </a:p>
-                  </a:txBody>
-                  <a:tcPr marL="9525" marR="9525" marT="9525" marB="0" anchor="ctr">
-                    <a:lnT w="12700" cap="flat" cmpd="sng" algn="ctr">
-                      <a:solidFill>
-                        <a:schemeClr val="tx1"/>
-                      </a:solidFill>
-                      <a:prstDash val="solid"/>
-                      <a:round/>
-                      <a:headEnd type="none" w="med" len="med"/>
-                      <a:tailEnd type="none" w="med" len="med"/>
-                    </a:lnT>
-                    <a:lnB w="12700" cap="flat" cmpd="sng" algn="ctr">
-                      <a:solidFill>
-                        <a:schemeClr val="tx1"/>
-                      </a:solidFill>
-                      <a:prstDash val="solid"/>
-                      <a:round/>
-                      <a:headEnd type="none" w="med" len="med"/>
-                      <a:tailEnd type="none" w="med" len="med"/>
-                    </a:lnB>
-                  </a:tcPr>
-                </a:tc>
-                <a:extLst>
-                  <a:ext uri="{0D108BD9-81ED-4DB2-BD59-A6C34878D82A}">
-                    <a16:rowId xmlns:a16="http://schemas.microsoft.com/office/drawing/2014/main" val="2106950084"/>
-                  </a:ext>
-                </a:extLst>
-              </a:tr>
-              <a:tr h="209550">
-                <a:tc>
-                  <a:txBody>
-                    <a:bodyPr/>
-                    <a:lstStyle/>
-                    <a:p>
-                      <a:pPr algn="ctr" fontAlgn="ctr"/>
-                      <a:r>
-                        <a:rPr lang="en-US" altLang="zh-TW" sz="1200" b="1" u="none" strike="noStrike">
-                          <a:solidFill>
-                            <a:srgbClr val="000000"/>
-                          </a:solidFill>
-                          <a:effectLst/>
-                          <a:latin typeface="+mn-lt"/>
-                        </a:rPr>
-                        <a:t>3</a:t>
-                      </a:r>
-                      <a:endParaRPr lang="en-US" altLang="zh-TW" sz="1200" b="1" i="0" u="none" strike="noStrike" dirty="0">
-                        <a:solidFill>
-                          <a:srgbClr val="000000"/>
-                        </a:solidFill>
-                        <a:effectLst/>
-                        <a:latin typeface="+mn-lt"/>
-                        <a:ea typeface="新細明體" panose="02020500000000000000" pitchFamily="18" charset="-120"/>
-                      </a:endParaRPr>
-                    </a:p>
-                  </a:txBody>
-                  <a:tcPr marL="9525" marR="9525" marT="9525" marB="0" anchor="ctr">
-                    <a:lnT w="12700" cap="flat" cmpd="sng" algn="ctr">
-                      <a:solidFill>
-                        <a:schemeClr val="tx1"/>
-                      </a:solidFill>
-                      <a:prstDash val="solid"/>
-                      <a:round/>
-                      <a:headEnd type="none" w="med" len="med"/>
-                      <a:tailEnd type="none" w="med" len="med"/>
-                    </a:lnT>
-                    <a:lnB w="12700" cap="flat" cmpd="sng" algn="ctr">
-                      <a:solidFill>
-                        <a:schemeClr val="tx1"/>
-                      </a:solidFill>
-                      <a:prstDash val="solid"/>
-                      <a:round/>
-                      <a:headEnd type="none" w="med" len="med"/>
-                      <a:tailEnd type="none" w="med" len="med"/>
-                    </a:lnB>
-                  </a:tcPr>
-                </a:tc>
-                <a:tc>
-                  <a:txBody>
-                    <a:bodyPr/>
-                    <a:lstStyle/>
-                    <a:p>
-                      <a:pPr marL="0" marR="0" lvl="0" indent="0" algn="ctr" defTabSz="914400" rtl="0" eaLnBrk="1" fontAlgn="ctr" latinLnBrk="0" hangingPunct="1">
-                        <a:lnSpc>
-                          <a:spcPct val="100000"/>
-                        </a:lnSpc>
-                        <a:spcBef>
-                          <a:spcPts val="0"/>
-                        </a:spcBef>
-                        <a:spcAft>
-                          <a:spcPts val="0"/>
-                        </a:spcAft>
-                        <a:buClrTx/>
-                        <a:buSzTx/>
-                        <a:buFontTx/>
-                        <a:buNone/>
-                        <a:tabLst/>
-                        <a:defRPr/>
-                      </a:pPr>
-                      <a:r>
-                        <a:rPr kumimoji="0" lang="en-US" altLang="zh-TW" sz="1200" b="1" i="0" u="none" strike="noStrike" kern="1200" cap="none" spc="0" normalizeH="0" baseline="0" noProof="0" dirty="0">
-                          <a:ln>
-                            <a:noFill/>
-                          </a:ln>
-                          <a:solidFill>
-                            <a:srgbClr val="000000"/>
-                          </a:solidFill>
-                          <a:effectLst/>
-                          <a:uLnTx/>
-                          <a:uFillTx/>
-                          <a:latin typeface="+mn-lt"/>
-                          <a:ea typeface="+mn-ea"/>
-                          <a:cs typeface="+mn-cs"/>
-                        </a:rPr>
-                        <a:t>BiGRUWithAttentionLoRA</a:t>
-                      </a:r>
-                      <a:endParaRPr kumimoji="0" lang="en-US" altLang="zh-TW" sz="1200" b="1" i="0" u="none" strike="noStrike" kern="1200" cap="none" spc="0" normalizeH="0" baseline="0" noProof="0" dirty="0">
-                        <a:ln>
-                          <a:noFill/>
-                        </a:ln>
-                        <a:solidFill>
-                          <a:srgbClr val="000000"/>
-                        </a:solidFill>
-                        <a:effectLst/>
-                        <a:uLnTx/>
-                        <a:uFillTx/>
-                        <a:latin typeface="Calibri" panose="020F0502020204030204"/>
-                        <a:ea typeface="新細明體" panose="02020500000000000000" pitchFamily="18" charset="-120"/>
-                        <a:cs typeface="+mn-cs"/>
-                      </a:endParaRPr>
-                    </a:p>
-                    <a:p>
-                      <a:pPr marL="0" marR="0" lvl="0" indent="0" algn="ctr" defTabSz="914400" rtl="0" eaLnBrk="1" fontAlgn="ctr" latinLnBrk="0" hangingPunct="1">
-                        <a:lnSpc>
-                          <a:spcPct val="100000"/>
-                        </a:lnSpc>
-                        <a:spcBef>
-                          <a:spcPts val="0"/>
-                        </a:spcBef>
-                        <a:spcAft>
-                          <a:spcPts val="0"/>
-                        </a:spcAft>
-                        <a:buClrTx/>
-                        <a:buSzTx/>
-                        <a:buFontTx/>
-                        <a:buNone/>
-                        <a:tabLst/>
-                        <a:defRPr/>
-                      </a:pPr>
-                      <a:r>
-                        <a:rPr kumimoji="0" lang="pt-BR" altLang="zh-TW" sz="1200" b="1" i="0" u="none" strike="noStrike" kern="1200" cap="none" spc="0" normalizeH="0" baseline="0" noProof="0" dirty="0">
-                          <a:ln>
-                            <a:noFill/>
-                          </a:ln>
-                          <a:solidFill>
-                            <a:srgbClr val="000000"/>
-                          </a:solidFill>
-                          <a:effectLst/>
-                          <a:uLnTx/>
-                          <a:uFillTx/>
-                          <a:latin typeface="+mn-lt"/>
-                          <a:ea typeface="+mn-ea"/>
-                          <a:cs typeface="+mn-cs"/>
-                        </a:rPr>
-                        <a:t>(num_layers=4, lora_r=4, alpha=0.5)</a:t>
-                      </a:r>
-                    </a:p>
-                    <a:p>
-                      <a:pPr marL="0" marR="0" lvl="0" indent="0" algn="ctr" defTabSz="914400" rtl="0" eaLnBrk="1" fontAlgn="ctr" latinLnBrk="0" hangingPunct="1">
-                        <a:lnSpc>
-                          <a:spcPct val="100000"/>
-                        </a:lnSpc>
-                        <a:spcBef>
-                          <a:spcPts val="0"/>
-                        </a:spcBef>
-                        <a:spcAft>
-                          <a:spcPts val="0"/>
-                        </a:spcAft>
-                        <a:buClrTx/>
-                        <a:buSzTx/>
-                        <a:buFontTx/>
-                        <a:buNone/>
-                        <a:tabLst/>
-                        <a:defRPr/>
-                      </a:pPr>
-                      <a:r>
-                        <a:rPr kumimoji="0" lang="en-US" altLang="zh-TW" sz="1200" b="1" i="0" u="none" strike="noStrike" kern="1200" cap="none" spc="0" normalizeH="0" baseline="0" noProof="0" dirty="0">
-                          <a:ln>
-                            <a:noFill/>
-                          </a:ln>
-                          <a:solidFill>
-                            <a:srgbClr val="000000"/>
-                          </a:solidFill>
-                          <a:effectLst/>
-                          <a:uLnTx/>
-                          <a:uFillTx/>
-                          <a:latin typeface="+mn-lt"/>
-                          <a:ea typeface="+mn-ea"/>
-                          <a:cs typeface="+mn-cs"/>
-                        </a:rPr>
-                        <a:t>saved in '1st_try'</a:t>
-                      </a:r>
-                      <a:endParaRPr kumimoji="0" lang="en-US" altLang="zh-TW" sz="1200" b="1" i="0" u="none" strike="noStrike" kern="1200" cap="none" spc="0" normalizeH="0" baseline="0" noProof="0" dirty="0">
-                        <a:ln>
-                          <a:noFill/>
-                        </a:ln>
-                        <a:solidFill>
-                          <a:srgbClr val="000000"/>
-                        </a:solidFill>
-                        <a:effectLst/>
-                        <a:uLnTx/>
-                        <a:uFillTx/>
-                        <a:latin typeface="Calibri" panose="020F0502020204030204"/>
-                        <a:ea typeface="新細明體" panose="02020500000000000000" pitchFamily="18" charset="-120"/>
-                        <a:cs typeface="+mn-cs"/>
-                      </a:endParaRPr>
-                    </a:p>
-                  </a:txBody>
-                  <a:tcPr marL="9525" marR="9525" marT="9525" marB="0" anchor="ctr">
-                    <a:lnT w="12700" cap="flat" cmpd="sng" algn="ctr">
-                      <a:solidFill>
-                        <a:schemeClr val="tx1"/>
-                      </a:solidFill>
-                      <a:prstDash val="solid"/>
-                      <a:round/>
-                      <a:headEnd type="none" w="med" len="med"/>
-                      <a:tailEnd type="none" w="med" len="med"/>
-                    </a:lnT>
-                    <a:lnB w="12700" cap="flat" cmpd="sng" algn="ctr">
-                      <a:solidFill>
-                        <a:schemeClr val="tx1"/>
-                      </a:solidFill>
-                      <a:prstDash val="solid"/>
-                      <a:round/>
-                      <a:headEnd type="none" w="med" len="med"/>
-                      <a:tailEnd type="none" w="med" len="med"/>
-                    </a:lnB>
-                  </a:tcPr>
-                </a:tc>
-                <a:tc>
-                  <a:txBody>
-                    <a:bodyPr/>
-                    <a:lstStyle/>
-                    <a:p>
-                      <a:pPr marL="0" marR="0" lvl="0" indent="0" algn="ctr" defTabSz="914400" rtl="0" eaLnBrk="1" fontAlgn="ctr" latinLnBrk="0" hangingPunct="1">
-                        <a:lnSpc>
-                          <a:spcPct val="100000"/>
-                        </a:lnSpc>
-                        <a:spcBef>
-                          <a:spcPts val="0"/>
-                        </a:spcBef>
-                        <a:spcAft>
-                          <a:spcPts val="0"/>
-                        </a:spcAft>
-                        <a:buClrTx/>
-                        <a:buSzTx/>
-                        <a:buFontTx/>
-                        <a:buNone/>
-                        <a:tabLst/>
-                        <a:defRPr/>
-                      </a:pPr>
-                      <a:r>
-                        <a:rPr lang="en-US" altLang="zh-TW" sz="1200" b="1" kern="1200" dirty="0">
-                          <a:solidFill>
-                            <a:schemeClr val="tx1"/>
-                          </a:solidFill>
-                          <a:effectLst/>
-                          <a:latin typeface="+mn-lt"/>
-                          <a:ea typeface="+mn-ea"/>
-                          <a:cs typeface="+mn-cs"/>
-                        </a:rPr>
-                        <a:t>97.53</a:t>
-                      </a:r>
-                      <a:endParaRPr lang="zh-TW" altLang="en-US" sz="1200" b="1" kern="1200" dirty="0">
-                        <a:solidFill>
-                          <a:schemeClr val="tx1"/>
-                        </a:solidFill>
-                        <a:effectLst/>
-                        <a:latin typeface="+mn-lt"/>
-                        <a:ea typeface="+mn-ea"/>
-                        <a:cs typeface="+mn-cs"/>
-                      </a:endParaRPr>
-                    </a:p>
-                  </a:txBody>
-                  <a:tcPr marL="9525" marR="9525" marT="9525" marB="0" anchor="ctr">
-                    <a:lnT w="12700" cap="flat" cmpd="sng" algn="ctr">
-                      <a:solidFill>
-                        <a:schemeClr val="tx1"/>
-                      </a:solidFill>
-                      <a:prstDash val="solid"/>
-                      <a:round/>
-                      <a:headEnd type="none" w="med" len="med"/>
-                      <a:tailEnd type="none" w="med" len="med"/>
-                    </a:lnT>
-                    <a:lnB w="12700" cap="flat" cmpd="sng" algn="ctr">
-                      <a:solidFill>
-                        <a:schemeClr val="tx1"/>
-                      </a:solidFill>
-                      <a:prstDash val="solid"/>
-                      <a:round/>
-                      <a:headEnd type="none" w="med" len="med"/>
-                      <a:tailEnd type="none" w="med" len="med"/>
-                    </a:lnB>
-                  </a:tcPr>
-                </a:tc>
-                <a:tc>
-                  <a:txBody>
-                    <a:bodyPr/>
-                    <a:lstStyle/>
-                    <a:p>
-                      <a:pPr algn="l"/>
-                      <a:r>
-                        <a:rPr lang="en-US" altLang="zh-TW" sz="1200" b="1" kern="1200" dirty="0">
-                          <a:solidFill>
-                            <a:schemeClr val="tx1"/>
-                          </a:solidFill>
-                          <a:effectLst/>
-                          <a:latin typeface="+mn-lt"/>
-                          <a:ea typeface="+mn-ea"/>
-                          <a:cs typeface="+mn-cs"/>
-                        </a:rPr>
-                        <a:t>{0: 88.15%, 1: 98.31%, 2: 93.32%, 3: 99.11%}</a:t>
-                      </a:r>
-                      <a:endParaRPr lang="zh-TW" altLang="en-US" sz="1200" b="1" kern="1200" dirty="0">
-                        <a:solidFill>
-                          <a:schemeClr val="tx1"/>
-                        </a:solidFill>
-                        <a:effectLst/>
-                        <a:latin typeface="+mn-lt"/>
-                        <a:ea typeface="+mn-ea"/>
-                        <a:cs typeface="+mn-cs"/>
-                      </a:endParaRPr>
-                    </a:p>
-                  </a:txBody>
-                  <a:tcPr marL="9525" marR="9525" marT="9525" marB="0" anchor="ctr">
-                    <a:lnT w="12700" cap="flat" cmpd="sng" algn="ctr">
-                      <a:solidFill>
-                        <a:schemeClr val="tx1"/>
-                      </a:solidFill>
-                      <a:prstDash val="solid"/>
-                      <a:round/>
-                      <a:headEnd type="none" w="med" len="med"/>
-                      <a:tailEnd type="none" w="med" len="med"/>
-                    </a:lnT>
-                    <a:lnB w="12700" cap="flat" cmpd="sng" algn="ctr">
-                      <a:solidFill>
-                        <a:schemeClr val="tx1"/>
-                      </a:solidFill>
-                      <a:prstDash val="solid"/>
-                      <a:round/>
-                      <a:headEnd type="none" w="med" len="med"/>
-                      <a:tailEnd type="none" w="med" len="med"/>
-                    </a:lnB>
-                  </a:tcPr>
-                </a:tc>
-                <a:extLst>
-                  <a:ext uri="{0D108BD9-81ED-4DB2-BD59-A6C34878D82A}">
-                    <a16:rowId xmlns:a16="http://schemas.microsoft.com/office/drawing/2014/main" val="3093903797"/>
-                  </a:ext>
-                </a:extLst>
-              </a:tr>
-              <a:tr h="209550">
-                <a:tc>
-                  <a:txBody>
-                    <a:bodyPr/>
-                    <a:lstStyle/>
-                    <a:p>
-                      <a:pPr algn="ctr" fontAlgn="ctr"/>
-                      <a:r>
-                        <a:rPr lang="en-US" altLang="zh-TW" sz="1200" b="1" u="none" strike="noStrike">
-                          <a:solidFill>
-                            <a:srgbClr val="000000"/>
-                          </a:solidFill>
-                          <a:effectLst/>
-                          <a:latin typeface="+mn-lt"/>
-                        </a:rPr>
-                        <a:t>4</a:t>
-                      </a:r>
-                      <a:endParaRPr lang="en-US" altLang="zh-TW" sz="1200" b="1" i="0" u="none" strike="noStrike" dirty="0">
-                        <a:solidFill>
-                          <a:srgbClr val="000000"/>
-                        </a:solidFill>
-                        <a:effectLst/>
-                        <a:latin typeface="+mn-lt"/>
-                        <a:ea typeface="新細明體" panose="02020500000000000000" pitchFamily="18" charset="-120"/>
-                      </a:endParaRPr>
-                    </a:p>
-                  </a:txBody>
-                  <a:tcPr marL="9525" marR="9525" marT="9525" marB="0" anchor="ctr">
-                    <a:lnT w="12700" cap="flat" cmpd="sng" algn="ctr">
-                      <a:solidFill>
-                        <a:schemeClr val="tx1"/>
-                      </a:solidFill>
-                      <a:prstDash val="solid"/>
-                      <a:round/>
-                      <a:headEnd type="none" w="med" len="med"/>
-                      <a:tailEnd type="none" w="med" len="med"/>
-                    </a:lnT>
-                    <a:lnB w="12700" cap="flat" cmpd="sng" algn="ctr">
-                      <a:solidFill>
-                        <a:schemeClr val="tx1"/>
-                      </a:solidFill>
-                      <a:prstDash val="solid"/>
-                      <a:round/>
-                      <a:headEnd type="none" w="med" len="med"/>
-                      <a:tailEnd type="none" w="med" len="med"/>
-                    </a:lnB>
-                  </a:tcPr>
-                </a:tc>
-                <a:tc>
-                  <a:txBody>
-                    <a:bodyPr/>
-                    <a:lstStyle/>
-                    <a:p>
-                      <a:pPr marL="0" marR="0" lvl="0" indent="0" algn="ctr" defTabSz="914400" rtl="0" eaLnBrk="1" fontAlgn="ctr" latinLnBrk="0" hangingPunct="1">
-                        <a:lnSpc>
-                          <a:spcPct val="100000"/>
-                        </a:lnSpc>
-                        <a:spcBef>
-                          <a:spcPts val="0"/>
-                        </a:spcBef>
-                        <a:spcAft>
-                          <a:spcPts val="0"/>
-                        </a:spcAft>
-                        <a:buClrTx/>
-                        <a:buSzTx/>
-                        <a:buFontTx/>
-                        <a:buNone/>
-                        <a:tabLst/>
-                        <a:defRPr/>
-                      </a:pPr>
-                      <a:r>
-                        <a:rPr kumimoji="0" lang="en-US" altLang="zh-TW" sz="1200" b="1" i="0" u="none" strike="noStrike" kern="1200" cap="none" spc="0" normalizeH="0" baseline="0" noProof="0" dirty="0">
-                          <a:ln>
-                            <a:noFill/>
-                          </a:ln>
-                          <a:solidFill>
-                            <a:srgbClr val="000000"/>
-                          </a:solidFill>
-                          <a:effectLst/>
-                          <a:uLnTx/>
-                          <a:uFillTx/>
-                          <a:latin typeface="+mn-lt"/>
-                          <a:ea typeface="+mn-ea"/>
-                          <a:cs typeface="+mn-cs"/>
-                        </a:rPr>
-                        <a:t>BiGRUWithAttentionLoRA</a:t>
-                      </a:r>
-                      <a:endParaRPr kumimoji="0" lang="en-US" altLang="zh-TW" sz="1200" b="1" i="0" u="none" strike="noStrike" kern="1200" cap="none" spc="0" normalizeH="0" baseline="0" noProof="0" dirty="0">
-                        <a:ln>
-                          <a:noFill/>
-                        </a:ln>
-                        <a:solidFill>
-                          <a:srgbClr val="000000"/>
-                        </a:solidFill>
-                        <a:effectLst/>
-                        <a:uLnTx/>
-                        <a:uFillTx/>
-                        <a:latin typeface="Calibri" panose="020F0502020204030204"/>
-                        <a:ea typeface="新細明體" panose="02020500000000000000" pitchFamily="18" charset="-120"/>
-                        <a:cs typeface="+mn-cs"/>
-                      </a:endParaRPr>
-                    </a:p>
-                    <a:p>
-                      <a:pPr marL="0" marR="0" lvl="0" indent="0" algn="ctr" defTabSz="914400" rtl="0" eaLnBrk="1" fontAlgn="ctr" latinLnBrk="0" hangingPunct="1">
-                        <a:lnSpc>
-                          <a:spcPct val="100000"/>
-                        </a:lnSpc>
-                        <a:spcBef>
-                          <a:spcPts val="0"/>
-                        </a:spcBef>
-                        <a:spcAft>
-                          <a:spcPts val="0"/>
-                        </a:spcAft>
-                        <a:buClrTx/>
-                        <a:buSzTx/>
-                        <a:buFontTx/>
-                        <a:buNone/>
-                        <a:tabLst/>
-                        <a:defRPr/>
-                      </a:pPr>
-                      <a:r>
-                        <a:rPr kumimoji="0" lang="pt-BR" altLang="zh-TW" sz="1200" b="1" i="0" u="none" strike="noStrike" kern="1200" cap="none" spc="0" normalizeH="0" baseline="0" noProof="0" dirty="0">
-                          <a:ln>
-                            <a:noFill/>
-                          </a:ln>
-                          <a:solidFill>
-                            <a:srgbClr val="000000"/>
-                          </a:solidFill>
-                          <a:effectLst/>
-                          <a:uLnTx/>
-                          <a:uFillTx/>
-                          <a:latin typeface="+mn-lt"/>
-                          <a:ea typeface="+mn-ea"/>
-                          <a:cs typeface="+mn-cs"/>
-                        </a:rPr>
-                        <a:t>(num_layers=4, lora_r=4, alpha=0.3)</a:t>
-                      </a:r>
-                    </a:p>
-                    <a:p>
-                      <a:pPr marL="0" marR="0" lvl="0" indent="0" algn="ctr" defTabSz="914400" rtl="0" eaLnBrk="1" fontAlgn="ctr" latinLnBrk="0" hangingPunct="1">
-                        <a:lnSpc>
-                          <a:spcPct val="100000"/>
-                        </a:lnSpc>
-                        <a:spcBef>
-                          <a:spcPts val="0"/>
-                        </a:spcBef>
-                        <a:spcAft>
-                          <a:spcPts val="0"/>
-                        </a:spcAft>
-                        <a:buClrTx/>
-                        <a:buSzTx/>
-                        <a:buFontTx/>
-                        <a:buNone/>
-                        <a:tabLst/>
-                        <a:defRPr/>
-                      </a:pPr>
-                      <a:r>
-                        <a:rPr kumimoji="0" lang="en-US" altLang="zh-TW" sz="1200" b="1" i="0" u="none" strike="noStrike" kern="1200" cap="none" spc="0" normalizeH="0" baseline="0" noProof="0" dirty="0">
-                          <a:ln>
-                            <a:noFill/>
-                          </a:ln>
-                          <a:solidFill>
-                            <a:srgbClr val="000000"/>
-                          </a:solidFill>
-                          <a:effectLst/>
-                          <a:uLnTx/>
-                          <a:uFillTx/>
-                          <a:latin typeface="+mn-lt"/>
-                          <a:ea typeface="+mn-ea"/>
-                          <a:cs typeface="+mn-cs"/>
-                        </a:rPr>
-                        <a:t>saved in '3rd_try' </a:t>
-                      </a:r>
-                      <a:endParaRPr kumimoji="0" lang="en-US" altLang="zh-TW" sz="1200" b="1" i="0" u="none" strike="noStrike" kern="1200" cap="none" spc="0" normalizeH="0" baseline="0" noProof="0" dirty="0">
-                        <a:ln>
-                          <a:noFill/>
-                        </a:ln>
-                        <a:solidFill>
-                          <a:srgbClr val="000000"/>
-                        </a:solidFill>
-                        <a:effectLst/>
-                        <a:uLnTx/>
-                        <a:uFillTx/>
-                        <a:latin typeface="Calibri" panose="020F0502020204030204"/>
-                        <a:ea typeface="新細明體" panose="02020500000000000000" pitchFamily="18" charset="-120"/>
-                        <a:cs typeface="+mn-cs"/>
-                      </a:endParaRPr>
-                    </a:p>
-                  </a:txBody>
-                  <a:tcPr marL="9525" marR="9525" marT="9525" marB="0" anchor="ctr">
-                    <a:lnT w="12700" cap="flat" cmpd="sng" algn="ctr">
-                      <a:solidFill>
-                        <a:schemeClr val="tx1"/>
-                      </a:solidFill>
-                      <a:prstDash val="solid"/>
-                      <a:round/>
-                      <a:headEnd type="none" w="med" len="med"/>
-                      <a:tailEnd type="none" w="med" len="med"/>
-                    </a:lnT>
-                    <a:lnB w="12700" cap="flat" cmpd="sng" algn="ctr">
-                      <a:solidFill>
-                        <a:schemeClr val="tx1"/>
-                      </a:solidFill>
-                      <a:prstDash val="solid"/>
-                      <a:round/>
-                      <a:headEnd type="none" w="med" len="med"/>
-                      <a:tailEnd type="none" w="med" len="med"/>
-                    </a:lnB>
-                  </a:tcPr>
-                </a:tc>
-                <a:tc>
-                  <a:txBody>
-                    <a:bodyPr/>
-                    <a:lstStyle/>
-                    <a:p>
-                      <a:pPr marL="0" marR="0" lvl="0" indent="0" algn="ctr" defTabSz="914400" rtl="0" eaLnBrk="1" fontAlgn="ctr" latinLnBrk="0" hangingPunct="1">
-                        <a:lnSpc>
-                          <a:spcPct val="100000"/>
-                        </a:lnSpc>
-                        <a:spcBef>
-                          <a:spcPts val="0"/>
-                        </a:spcBef>
-                        <a:spcAft>
-                          <a:spcPts val="0"/>
-                        </a:spcAft>
-                        <a:buClrTx/>
-                        <a:buSzTx/>
-                        <a:buFontTx/>
-                        <a:buNone/>
-                        <a:tabLst/>
-                        <a:defRPr/>
-                      </a:pPr>
-                      <a:r>
-                        <a:rPr lang="en-US" altLang="zh-TW" sz="1200" b="1" kern="1200" dirty="0">
-                          <a:solidFill>
-                            <a:schemeClr val="tx1"/>
-                          </a:solidFill>
-                          <a:effectLst/>
-                          <a:latin typeface="+mn-lt"/>
-                          <a:ea typeface="+mn-ea"/>
-                          <a:cs typeface="+mn-cs"/>
-                        </a:rPr>
-                        <a:t>96.40</a:t>
-                      </a:r>
-                      <a:endParaRPr lang="zh-TW" altLang="en-US" sz="1200" b="1" kern="1200" dirty="0">
-                        <a:solidFill>
-                          <a:schemeClr val="tx1"/>
-                        </a:solidFill>
-                        <a:effectLst/>
-                        <a:latin typeface="+mn-lt"/>
-                        <a:ea typeface="+mn-ea"/>
-                        <a:cs typeface="+mn-cs"/>
-                      </a:endParaRPr>
-                    </a:p>
-                  </a:txBody>
-                  <a:tcPr marL="9525" marR="9525" marT="9525" marB="0" anchor="ctr">
-                    <a:lnT w="12700" cap="flat" cmpd="sng" algn="ctr">
-                      <a:solidFill>
-                        <a:schemeClr val="tx1"/>
-                      </a:solidFill>
-                      <a:prstDash val="solid"/>
-                      <a:round/>
-                      <a:headEnd type="none" w="med" len="med"/>
-                      <a:tailEnd type="none" w="med" len="med"/>
-                    </a:lnT>
-                    <a:lnB w="12700" cap="flat" cmpd="sng" algn="ctr">
-                      <a:solidFill>
-                        <a:schemeClr val="tx1"/>
-                      </a:solidFill>
-                      <a:prstDash val="solid"/>
-                      <a:round/>
-                      <a:headEnd type="none" w="med" len="med"/>
-                      <a:tailEnd type="none" w="med" len="med"/>
-                    </a:lnB>
-                  </a:tcPr>
-                </a:tc>
-                <a:tc>
-                  <a:txBody>
-                    <a:bodyPr/>
-                    <a:lstStyle/>
-                    <a:p>
-                      <a:pPr marL="0" marR="0" lvl="0" indent="0" algn="l" defTabSz="914400" rtl="0" eaLnBrk="1" fontAlgn="ctr" latinLnBrk="0" hangingPunct="1">
-                        <a:lnSpc>
-                          <a:spcPct val="100000"/>
-                        </a:lnSpc>
-                        <a:spcBef>
-                          <a:spcPts val="0"/>
-                        </a:spcBef>
-                        <a:spcAft>
-                          <a:spcPts val="0"/>
-                        </a:spcAft>
-                        <a:buClrTx/>
-                        <a:buSzTx/>
-                        <a:buFontTx/>
-                        <a:buNone/>
-                        <a:tabLst/>
-                        <a:defRPr/>
-                      </a:pPr>
-                      <a:r>
-                        <a:rPr lang="en-US" altLang="zh-TW" sz="1200" b="1" kern="1200" dirty="0">
-                          <a:solidFill>
-                            <a:schemeClr val="tx1"/>
-                          </a:solidFill>
-                          <a:effectLst/>
-                          <a:latin typeface="+mn-lt"/>
-                          <a:ea typeface="+mn-ea"/>
-                          <a:cs typeface="+mn-cs"/>
-                        </a:rPr>
-                        <a:t>{0: 91.25%, 1: 96.34%, 2: 89.94%, 3: 98.33%, 4: 98.16%}</a:t>
-                      </a:r>
-                      <a:endParaRPr lang="zh-TW" altLang="en-US" sz="1200" b="1" kern="1200" dirty="0">
-                        <a:solidFill>
-                          <a:schemeClr val="tx1"/>
-                        </a:solidFill>
-                        <a:effectLst/>
-                        <a:latin typeface="+mn-lt"/>
-                        <a:ea typeface="+mn-ea"/>
-                        <a:cs typeface="+mn-cs"/>
-                      </a:endParaRPr>
-                    </a:p>
-                  </a:txBody>
-                  <a:tcPr marL="9525" marR="9525" marT="9525" marB="0" anchor="ctr">
-                    <a:lnT w="12700" cap="flat" cmpd="sng" algn="ctr">
-                      <a:solidFill>
-                        <a:schemeClr val="tx1"/>
-                      </a:solidFill>
-                      <a:prstDash val="solid"/>
-                      <a:round/>
-                      <a:headEnd type="none" w="med" len="med"/>
-                      <a:tailEnd type="none" w="med" len="med"/>
-                    </a:lnT>
-                    <a:lnB w="12700" cap="flat" cmpd="sng" algn="ctr">
-                      <a:solidFill>
-                        <a:schemeClr val="tx1"/>
-                      </a:solidFill>
-                      <a:prstDash val="solid"/>
-                      <a:round/>
-                      <a:headEnd type="none" w="med" len="med"/>
-                      <a:tailEnd type="none" w="med" len="med"/>
-                    </a:lnB>
-                  </a:tcPr>
-                </a:tc>
-                <a:extLst>
-                  <a:ext uri="{0D108BD9-81ED-4DB2-BD59-A6C34878D82A}">
-                    <a16:rowId xmlns:a16="http://schemas.microsoft.com/office/drawing/2014/main" val="435917672"/>
-                  </a:ext>
-                </a:extLst>
-              </a:tr>
-            </a:tbl>
-          </a:graphicData>
-        </a:graphic>
-      </p:graphicFrame>
-      <p:sp>
-        <p:nvSpPr>
-          <p:cNvPr id="5" name="文字方塊 4">
-            <a:extLst>
-              <a:ext uri="{FF2B5EF4-FFF2-40B4-BE49-F238E27FC236}">
-                <a16:creationId xmlns:a16="http://schemas.microsoft.com/office/drawing/2014/main" id="{51372776-2537-403D-951C-80FEB73E8279}"/>
-              </a:ext>
-            </a:extLst>
-          </p:cNvPr>
-          <p:cNvSpPr txBox="1"/>
-          <p:nvPr/>
-        </p:nvSpPr>
-        <p:spPr>
-          <a:xfrm>
-            <a:off x="3048699" y="4824412"/>
-            <a:ext cx="6094602" cy="276999"/>
-          </a:xfrm>
-          <a:prstGeom prst="rect">
-            <a:avLst/>
-          </a:prstGeom>
-          <a:noFill/>
-        </p:spPr>
-        <p:txBody>
-          <a:bodyPr wrap="square">
-            <a:spAutoFit/>
-          </a:bodyPr>
-          <a:lstStyle/>
-          <a:p>
-            <a:pPr algn="ctr"/>
-            <a:r>
-              <a:rPr lang="en-US" altLang="zh-TW" sz="1200" b="1" dirty="0">
-                <a:latin typeface="Abadi" panose="020B0604020104020204" pitchFamily="34" charset="0"/>
-              </a:rPr>
-              <a:t>▲</a:t>
-            </a:r>
-            <a:r>
-              <a:rPr lang="en-US" altLang="zh-TW" sz="1200" b="1" dirty="0"/>
-              <a:t> BiGRUWithAttentionLoRA (from Legacy_Code.ipynb)</a:t>
-            </a:r>
-            <a:endParaRPr lang="zh-TW" altLang="en-US" sz="1200" b="1" dirty="0"/>
-          </a:p>
-        </p:txBody>
-      </p:sp>
-      <p:sp>
-        <p:nvSpPr>
-          <p:cNvPr id="7" name="文字方塊 6">
-            <a:extLst>
-              <a:ext uri="{FF2B5EF4-FFF2-40B4-BE49-F238E27FC236}">
-                <a16:creationId xmlns:a16="http://schemas.microsoft.com/office/drawing/2014/main" id="{04B7CC41-FD84-4E1B-A640-D9FF174EB156}"/>
-              </a:ext>
-            </a:extLst>
-          </p:cNvPr>
-          <p:cNvSpPr txBox="1"/>
-          <p:nvPr/>
-        </p:nvSpPr>
-        <p:spPr>
-          <a:xfrm>
-            <a:off x="3048699" y="1570136"/>
-            <a:ext cx="6096000" cy="369332"/>
-          </a:xfrm>
-          <a:prstGeom prst="rect">
-            <a:avLst/>
-          </a:prstGeom>
-          <a:noFill/>
-        </p:spPr>
-        <p:txBody>
-          <a:bodyPr wrap="square">
-            <a:spAutoFit/>
-          </a:bodyPr>
-          <a:lstStyle/>
-          <a:p>
-            <a:pPr algn="ctr"/>
-            <a:r>
-              <a:rPr lang="en-US" altLang="zh-TW" b="1" dirty="0"/>
-              <a:t>Legacy_Code.ipynb</a:t>
-            </a:r>
-            <a:r>
-              <a:rPr lang="zh-TW" altLang="en-US" b="1" dirty="0"/>
-              <a:t> </a:t>
-            </a:r>
-            <a:r>
-              <a:rPr lang="en-US" altLang="zh-TW" b="1" dirty="0">
-                <a:solidFill>
-                  <a:srgbClr val="FF0000"/>
-                </a:solidFill>
-              </a:rPr>
-              <a:t>(not considered)</a:t>
-            </a:r>
-            <a:endParaRPr lang="zh-TW" altLang="en-US" b="1" dirty="0">
-              <a:solidFill>
-                <a:srgbClr val="FF0000"/>
-              </a:solidFill>
-            </a:endParaRPr>
-          </a:p>
-        </p:txBody>
-      </p:sp>
-    </p:spTree>
-    <p:extLst>
-      <p:ext uri="{BB962C8B-B14F-4D97-AF65-F5344CB8AC3E}">
-        <p14:creationId xmlns:p14="http://schemas.microsoft.com/office/powerpoint/2010/main" val="1722276546"/>
-      </p:ext>
-    </p:extLst>
-  </p:cSld>
-  <p:clrMapOvr>
-    <a:masterClrMapping/>
-  </p:clrMapOvr>
-</p:sld>
-</file>
-
-<file path=ppt/slides/slide4.xml><?xml version="1.0" encoding="utf-8"?>
 <p:sld xmlns:a="http://schemas.openxmlformats.org/drawingml/2006/main" xmlns:r="http://schemas.openxmlformats.org/officeDocument/2006/relationships" xmlns:p="http://schemas.openxmlformats.org/presentationml/2006/main">
   <p:cSld>
     <p:spTree>
@@ -8828,14 +7435,6 @@
               <a:rPr lang="en-US" altLang="zh-TW" b="1" dirty="0"/>
               <a:t>KL_Div_Distillation_CIL_Classif_Bi_Dir_GRU_Model.ipynb</a:t>
             </a:r>
-            <a:r>
-              <a:rPr lang="zh-TW" altLang="en-US" b="1" dirty="0"/>
-              <a:t> </a:t>
-            </a:r>
-            <a:r>
-              <a:rPr lang="en-US" altLang="zh-TW" b="1" dirty="0"/>
-              <a:t>(update)</a:t>
-            </a:r>
             <a:endParaRPr lang="zh-TW" altLang="en-US" b="1" dirty="0"/>
           </a:p>
         </p:txBody>
@@ -8853,7 +7452,7 @@
 </p:sld>
 </file>
 
-<file path=ppt/slides/slide5.xml><?xml version="1.0" encoding="utf-8"?>
+<file path=ppt/slides/slide4.xml><?xml version="1.0" encoding="utf-8"?>
 <p:sld xmlns:a="http://schemas.openxmlformats.org/drawingml/2006/main" xmlns:r="http://schemas.openxmlformats.org/officeDocument/2006/relationships" xmlns:p="http://schemas.openxmlformats.org/presentationml/2006/main">
   <p:cSld>
     <p:spTree>
@@ -10207,16 +8806,8 @@
           <a:p>
             <a:pPr algn="ctr"/>
             <a:r>
-              <a:rPr lang="en-US" altLang="zh-TW" b="1" dirty="0"/>
+              <a:rPr lang="en-US" altLang="zh-TW" b="1" dirty="0" err="1"/>
               <a:t>EWC_CL_Classif_Bi_Dir_GRU_Model.ipynb</a:t>
-            </a:r>
-            <a:r>
-              <a:rPr lang="zh-TW" altLang="en-US" b="1" dirty="0"/>
-              <a:t> </a:t>
-            </a:r>
-            <a:r>
-              <a:rPr lang="en-US" altLang="zh-TW" b="1" dirty="0"/>
-              <a:t>(update)</a:t>
             </a:r>
             <a:endParaRPr lang="zh-TW" altLang="en-US" b="1" dirty="0"/>
           </a:p>
@@ -10235,7 +8826,7 @@
 </p:sld>
 </file>
 
-<file path=ppt/slides/slide6.xml><?xml version="1.0" encoding="utf-8"?>
+<file path=ppt/slides/slide5.xml><?xml version="1.0" encoding="utf-8"?>
 <p:sld xmlns:a="http://schemas.openxmlformats.org/drawingml/2006/main" xmlns:r="http://schemas.openxmlformats.org/officeDocument/2006/relationships" xmlns:p="http://schemas.openxmlformats.org/presentationml/2006/main">
   <p:cSld>
     <p:spTree>
@@ -11592,14 +10183,6 @@
               <a:rPr lang="en-US" altLang="zh-TW" b="1" dirty="0"/>
               <a:t>Baseline_CL_Classif_Bi_Dir_GRU_Model.ipynb</a:t>
             </a:r>
-            <a:r>
-              <a:rPr lang="zh-TW" altLang="en-US" b="1" dirty="0"/>
-              <a:t> </a:t>
-            </a:r>
-            <a:r>
-              <a:rPr lang="en-US" altLang="zh-TW" b="1" dirty="0"/>
-              <a:t>(update)</a:t>
-            </a:r>
             <a:endParaRPr lang="zh-TW" altLang="en-US" b="1" dirty="0"/>
           </a:p>
         </p:txBody>
@@ -11617,7 +10200,7 @@
 </p:sld>
 </file>
 
-<file path=ppt/slides/slide7.xml><?xml version="1.0" encoding="utf-8"?>
+<file path=ppt/slides/slide6.xml><?xml version="1.0" encoding="utf-8"?>
 <p:sld xmlns:a="http://schemas.openxmlformats.org/drawingml/2006/main" xmlns:r="http://schemas.openxmlformats.org/officeDocument/2006/relationships" xmlns:p="http://schemas.openxmlformats.org/presentationml/2006/main">
   <p:cSld>
     <p:spTree>
@@ -12982,6 +11565,1380 @@
     <p:extLst>
       <p:ext uri="{BB962C8B-B14F-4D97-AF65-F5344CB8AC3E}">
         <p14:creationId xmlns:p14="http://schemas.microsoft.com/office/powerpoint/2010/main" val="525357061"/>
+      </p:ext>
+    </p:extLst>
+  </p:cSld>
+  <p:clrMapOvr>
+    <a:masterClrMapping/>
+  </p:clrMapOvr>
+</p:sld>
+</file>
+
+<file path=ppt/slides/slide7.xml><?xml version="1.0" encoding="utf-8"?>
+<p:sld xmlns:a="http://schemas.openxmlformats.org/drawingml/2006/main" xmlns:r="http://schemas.openxmlformats.org/officeDocument/2006/relationships" xmlns:p="http://schemas.openxmlformats.org/presentationml/2006/main">
+  <p:cSld>
+    <p:spTree>
+      <p:nvGrpSpPr>
+        <p:cNvPr id="1" name=""/>
+        <p:cNvGrpSpPr/>
+        <p:nvPr/>
+      </p:nvGrpSpPr>
+      <p:grpSpPr>
+        <a:xfrm>
+          <a:off x="0" y="0"/>
+          <a:ext cx="0" cy="0"/>
+          <a:chOff x="0" y="0"/>
+          <a:chExt cx="0" cy="0"/>
+        </a:xfrm>
+      </p:grpSpPr>
+      <p:graphicFrame>
+        <p:nvGraphicFramePr>
+          <p:cNvPr id="4" name="表格 3">
+            <a:extLst>
+              <a:ext uri="{FF2B5EF4-FFF2-40B4-BE49-F238E27FC236}">
+                <a16:creationId xmlns:a16="http://schemas.microsoft.com/office/drawing/2014/main" id="{60FA53F5-A086-44D4-9DBD-72749E825970}"/>
+              </a:ext>
+            </a:extLst>
+          </p:cNvPr>
+          <p:cNvGraphicFramePr>
+            <a:graphicFrameLocks noGrp="1"/>
+          </p:cNvGraphicFramePr>
+          <p:nvPr>
+            <p:extLst>
+              <p:ext uri="{D42A27DB-BD31-4B8C-83A1-F6EECF244321}">
+                <p14:modId xmlns:p14="http://schemas.microsoft.com/office/powerpoint/2010/main" val="452043428"/>
+              </p:ext>
+            </p:extLst>
+          </p:nvPr>
+        </p:nvGraphicFramePr>
+        <p:xfrm>
+          <a:off x="1784162" y="2216467"/>
+          <a:ext cx="8623676" cy="2607945"/>
+        </p:xfrm>
+        <a:graphic>
+          <a:graphicData uri="http://schemas.openxmlformats.org/drawingml/2006/table">
+            <a:tbl>
+              <a:tblPr firstRow="1">
+                <a:tableStyleId>{9D7B26C5-4107-4FEC-AEDC-1716B250A1EF}</a:tableStyleId>
+              </a:tblPr>
+              <a:tblGrid>
+                <a:gridCol w="838200">
+                  <a:extLst>
+                    <a:ext uri="{9D8B030D-6E8A-4147-A177-3AD203B41FA5}">
+                      <a16:colId xmlns:a16="http://schemas.microsoft.com/office/drawing/2014/main" val="3286517438"/>
+                    </a:ext>
+                  </a:extLst>
+                </a:gridCol>
+                <a:gridCol w="2914650">
+                  <a:extLst>
+                    <a:ext uri="{9D8B030D-6E8A-4147-A177-3AD203B41FA5}">
+                      <a16:colId xmlns:a16="http://schemas.microsoft.com/office/drawing/2014/main" val="1094686977"/>
+                    </a:ext>
+                  </a:extLst>
+                </a:gridCol>
+                <a:gridCol w="1181100">
+                  <a:extLst>
+                    <a:ext uri="{9D8B030D-6E8A-4147-A177-3AD203B41FA5}">
+                      <a16:colId xmlns:a16="http://schemas.microsoft.com/office/drawing/2014/main" val="218855835"/>
+                    </a:ext>
+                  </a:extLst>
+                </a:gridCol>
+                <a:gridCol w="3689726">
+                  <a:extLst>
+                    <a:ext uri="{9D8B030D-6E8A-4147-A177-3AD203B41FA5}">
+                      <a16:colId xmlns:a16="http://schemas.microsoft.com/office/drawing/2014/main" val="3780893304"/>
+                    </a:ext>
+                  </a:extLst>
+                </a:gridCol>
+              </a:tblGrid>
+              <a:tr h="209550">
+                <a:tc>
+                  <a:txBody>
+                    <a:bodyPr/>
+                    <a:lstStyle/>
+                    <a:p>
+                      <a:pPr algn="ctr" fontAlgn="ctr"/>
+                      <a:r>
+                        <a:rPr lang="en-US" sz="1200" b="1" u="none" strike="noStrike" dirty="0">
+                          <a:solidFill>
+                            <a:srgbClr val="000000"/>
+                          </a:solidFill>
+                          <a:effectLst/>
+                          <a:latin typeface="+mn-lt"/>
+                        </a:rPr>
+                        <a:t>Period</a:t>
+                      </a:r>
+                      <a:endParaRPr lang="en-US" sz="1200" b="1" i="0" u="none" strike="noStrike" dirty="0">
+                        <a:solidFill>
+                          <a:srgbClr val="000000"/>
+                        </a:solidFill>
+                        <a:effectLst/>
+                        <a:latin typeface="+mn-lt"/>
+                        <a:ea typeface="新細明體" panose="02020500000000000000" pitchFamily="18" charset="-120"/>
+                      </a:endParaRPr>
+                    </a:p>
+                  </a:txBody>
+                  <a:tcPr marL="9525" marR="9525" marT="9525" marB="0" anchor="ctr"/>
+                </a:tc>
+                <a:tc>
+                  <a:txBody>
+                    <a:bodyPr/>
+                    <a:lstStyle/>
+                    <a:p>
+                      <a:pPr algn="ctr" fontAlgn="ctr"/>
+                      <a:r>
+                        <a:rPr lang="en-US" sz="1200" b="1" u="none" strike="noStrike" dirty="0">
+                          <a:solidFill>
+                            <a:srgbClr val="000000"/>
+                          </a:solidFill>
+                          <a:effectLst/>
+                          <a:latin typeface="+mn-lt"/>
+                        </a:rPr>
+                        <a:t>Model &amp; Config</a:t>
+                      </a:r>
+                      <a:endParaRPr lang="en-US" sz="1200" b="1" i="0" u="none" strike="noStrike" dirty="0">
+                        <a:solidFill>
+                          <a:srgbClr val="000000"/>
+                        </a:solidFill>
+                        <a:effectLst/>
+                        <a:latin typeface="+mn-lt"/>
+                        <a:ea typeface="新細明體" panose="02020500000000000000" pitchFamily="18" charset="-120"/>
+                      </a:endParaRPr>
+                    </a:p>
+                  </a:txBody>
+                  <a:tcPr marL="9525" marR="9525" marT="9525" marB="0" anchor="ctr"/>
+                </a:tc>
+                <a:tc>
+                  <a:txBody>
+                    <a:bodyPr/>
+                    <a:lstStyle/>
+                    <a:p>
+                      <a:pPr algn="ctr" fontAlgn="ctr"/>
+                      <a:r>
+                        <a:rPr lang="en-US" sz="1200" b="1" u="none" strike="noStrike" dirty="0">
+                          <a:solidFill>
+                            <a:srgbClr val="000000"/>
+                          </a:solidFill>
+                          <a:effectLst/>
+                          <a:latin typeface="+mn-lt"/>
+                        </a:rPr>
+                        <a:t>Validation Accuracy (%)</a:t>
+                      </a:r>
+                      <a:endParaRPr lang="en-US" sz="1200" b="1" i="0" u="none" strike="noStrike" dirty="0">
+                        <a:solidFill>
+                          <a:srgbClr val="000000"/>
+                        </a:solidFill>
+                        <a:effectLst/>
+                        <a:latin typeface="+mn-lt"/>
+                        <a:ea typeface="新細明體" panose="02020500000000000000" pitchFamily="18" charset="-120"/>
+                      </a:endParaRPr>
+                    </a:p>
+                  </a:txBody>
+                  <a:tcPr marL="9525" marR="9525" marT="9525" marB="0" anchor="ctr"/>
+                </a:tc>
+                <a:tc>
+                  <a:txBody>
+                    <a:bodyPr/>
+                    <a:lstStyle/>
+                    <a:p>
+                      <a:pPr algn="ctr" fontAlgn="ctr"/>
+                      <a:r>
+                        <a:rPr lang="en-US" sz="1200" b="1" u="none" strike="noStrike" dirty="0">
+                          <a:solidFill>
+                            <a:srgbClr val="000000"/>
+                          </a:solidFill>
+                          <a:effectLst/>
+                          <a:latin typeface="+mn-lt"/>
+                        </a:rPr>
+                        <a:t>Class-wise Accuracy</a:t>
+                      </a:r>
+                      <a:endParaRPr lang="en-US" sz="1200" b="1" i="0" u="none" strike="noStrike" dirty="0">
+                        <a:solidFill>
+                          <a:srgbClr val="000000"/>
+                        </a:solidFill>
+                        <a:effectLst/>
+                        <a:latin typeface="+mn-lt"/>
+                        <a:ea typeface="新細明體" panose="02020500000000000000" pitchFamily="18" charset="-120"/>
+                      </a:endParaRPr>
+                    </a:p>
+                  </a:txBody>
+                  <a:tcPr marL="9525" marR="9525" marT="9525" marB="0" anchor="ctr"/>
+                </a:tc>
+                <a:extLst>
+                  <a:ext uri="{0D108BD9-81ED-4DB2-BD59-A6C34878D82A}">
+                    <a16:rowId xmlns:a16="http://schemas.microsoft.com/office/drawing/2014/main" val="2296710376"/>
+                  </a:ext>
+                </a:extLst>
+              </a:tr>
+              <a:tr h="209550">
+                <a:tc>
+                  <a:txBody>
+                    <a:bodyPr/>
+                    <a:lstStyle/>
+                    <a:p>
+                      <a:pPr algn="ctr" fontAlgn="ctr"/>
+                      <a:r>
+                        <a:rPr lang="en-US" altLang="zh-TW" sz="1200" b="1" u="none" strike="noStrike" dirty="0">
+                          <a:solidFill>
+                            <a:srgbClr val="000000"/>
+                          </a:solidFill>
+                          <a:effectLst/>
+                          <a:latin typeface="+mn-lt"/>
+                        </a:rPr>
+                        <a:t>1</a:t>
+                      </a:r>
+                      <a:endParaRPr lang="en-US" altLang="zh-TW" sz="1200" b="1" i="0" u="none" strike="noStrike" dirty="0">
+                        <a:solidFill>
+                          <a:srgbClr val="000000"/>
+                        </a:solidFill>
+                        <a:effectLst/>
+                        <a:latin typeface="+mn-lt"/>
+                        <a:ea typeface="新細明體" panose="02020500000000000000" pitchFamily="18" charset="-120"/>
+                      </a:endParaRPr>
+                    </a:p>
+                  </a:txBody>
+                  <a:tcPr marL="9525" marR="9525" marT="9525" marB="0" anchor="ctr">
+                    <a:lnB w="12700" cap="flat" cmpd="sng" algn="ctr">
+                      <a:solidFill>
+                        <a:schemeClr val="tx1"/>
+                      </a:solidFill>
+                      <a:prstDash val="solid"/>
+                      <a:round/>
+                      <a:headEnd type="none" w="med" len="med"/>
+                      <a:tailEnd type="none" w="med" len="med"/>
+                    </a:lnB>
+                  </a:tcPr>
+                </a:tc>
+                <a:tc>
+                  <a:txBody>
+                    <a:bodyPr/>
+                    <a:lstStyle/>
+                    <a:p>
+                      <a:pPr algn="ctr" fontAlgn="ctr"/>
+                      <a:r>
+                        <a:rPr lang="en-US" altLang="zh-TW" sz="1200" b="1" u="none" strike="noStrike" dirty="0">
+                          <a:solidFill>
+                            <a:srgbClr val="000000"/>
+                          </a:solidFill>
+                          <a:effectLst/>
+                          <a:latin typeface="+mn-lt"/>
+                        </a:rPr>
+                        <a:t>BiGRUWithAttention</a:t>
+                      </a:r>
+                    </a:p>
+                    <a:p>
+                      <a:pPr algn="ctr" fontAlgn="ctr"/>
+                      <a:r>
+                        <a:rPr lang="en-US" altLang="zh-TW" sz="1200" b="1" i="0" u="none" strike="noStrike" dirty="0">
+                          <a:solidFill>
+                            <a:srgbClr val="000000"/>
+                          </a:solidFill>
+                          <a:effectLst/>
+                          <a:latin typeface="+mn-lt"/>
+                          <a:ea typeface="+mn-ea"/>
+                        </a:rPr>
+                        <a:t>(num_layers=4)</a:t>
+                      </a:r>
+                    </a:p>
+                    <a:p>
+                      <a:pPr algn="ctr" fontAlgn="ctr"/>
+                      <a:r>
+                        <a:rPr lang="en-US" altLang="zh-TW" sz="1200" b="1" i="0" u="none" strike="noStrike" dirty="0">
+                          <a:solidFill>
+                            <a:srgbClr val="000000"/>
+                          </a:solidFill>
+                          <a:effectLst/>
+                          <a:latin typeface="+mn-lt"/>
+                          <a:ea typeface="+mn-ea"/>
+                        </a:rPr>
+                        <a:t>'LoRA_v1/Rank_4_Period_1/1st_try'</a:t>
+                      </a:r>
+                      <a:endParaRPr lang="en-US" altLang="zh-TW" sz="1200" b="1" i="0" u="none" strike="noStrike" dirty="0">
+                        <a:solidFill>
+                          <a:srgbClr val="000000"/>
+                        </a:solidFill>
+                        <a:effectLst/>
+                        <a:latin typeface="+mn-lt"/>
+                        <a:ea typeface="新細明體" panose="02020500000000000000" pitchFamily="18" charset="-120"/>
+                      </a:endParaRPr>
+                    </a:p>
+                  </a:txBody>
+                  <a:tcPr marL="9525" marR="9525" marT="9525" marB="0" anchor="ctr">
+                    <a:lnB w="12700" cap="flat" cmpd="sng" algn="ctr">
+                      <a:solidFill>
+                        <a:schemeClr val="tx1"/>
+                      </a:solidFill>
+                      <a:prstDash val="solid"/>
+                      <a:round/>
+                      <a:headEnd type="none" w="med" len="med"/>
+                      <a:tailEnd type="none" w="med" len="med"/>
+                    </a:lnB>
+                  </a:tcPr>
+                </a:tc>
+                <a:tc>
+                  <a:txBody>
+                    <a:bodyPr/>
+                    <a:lstStyle/>
+                    <a:p>
+                      <a:pPr algn="ctr" fontAlgn="ctr"/>
+                      <a:r>
+                        <a:rPr lang="en-US" altLang="zh-TW" sz="1200" b="1" u="none" strike="noStrike" dirty="0">
+                          <a:solidFill>
+                            <a:srgbClr val="000000"/>
+                          </a:solidFill>
+                          <a:effectLst/>
+                          <a:latin typeface="+mn-lt"/>
+                        </a:rPr>
+                        <a:t>98.36</a:t>
+                      </a:r>
+                    </a:p>
+                  </a:txBody>
+                  <a:tcPr marL="9525" marR="9525" marT="9525" marB="0" anchor="ctr">
+                    <a:lnB w="12700" cap="flat" cmpd="sng" algn="ctr">
+                      <a:solidFill>
+                        <a:schemeClr val="tx1"/>
+                      </a:solidFill>
+                      <a:prstDash val="solid"/>
+                      <a:round/>
+                      <a:headEnd type="none" w="med" len="med"/>
+                      <a:tailEnd type="none" w="med" len="med"/>
+                    </a:lnB>
+                  </a:tcPr>
+                </a:tc>
+                <a:tc>
+                  <a:txBody>
+                    <a:bodyPr/>
+                    <a:lstStyle/>
+                    <a:p>
+                      <a:pPr algn="l" fontAlgn="ctr"/>
+                      <a:r>
+                        <a:rPr lang="en-US" altLang="zh-TW" sz="1200" b="1" u="none" strike="noStrike" dirty="0">
+                          <a:solidFill>
+                            <a:srgbClr val="000000"/>
+                          </a:solidFill>
+                          <a:effectLst/>
+                          <a:latin typeface="+mn-lt"/>
+                        </a:rPr>
+                        <a:t>{0: 98.54%, 1: 98.09%}</a:t>
+                      </a:r>
+                    </a:p>
+                  </a:txBody>
+                  <a:tcPr marL="9525" marR="9525" marT="9525" marB="0" anchor="ctr">
+                    <a:lnB w="12700" cap="flat" cmpd="sng" algn="ctr">
+                      <a:solidFill>
+                        <a:schemeClr val="tx1"/>
+                      </a:solidFill>
+                      <a:prstDash val="solid"/>
+                      <a:round/>
+                      <a:headEnd type="none" w="med" len="med"/>
+                      <a:tailEnd type="none" w="med" len="med"/>
+                    </a:lnB>
+                  </a:tcPr>
+                </a:tc>
+                <a:extLst>
+                  <a:ext uri="{0D108BD9-81ED-4DB2-BD59-A6C34878D82A}">
+                    <a16:rowId xmlns:a16="http://schemas.microsoft.com/office/drawing/2014/main" val="1742789668"/>
+                  </a:ext>
+                </a:extLst>
+              </a:tr>
+              <a:tr h="209550">
+                <a:tc>
+                  <a:txBody>
+                    <a:bodyPr/>
+                    <a:lstStyle/>
+                    <a:p>
+                      <a:pPr algn="ctr" fontAlgn="ctr"/>
+                      <a:r>
+                        <a:rPr lang="en-US" altLang="zh-TW" sz="1200" b="1" i="0" u="none" strike="noStrike">
+                          <a:solidFill>
+                            <a:srgbClr val="000000"/>
+                          </a:solidFill>
+                          <a:effectLst/>
+                          <a:latin typeface="+mn-lt"/>
+                          <a:ea typeface="新細明體" panose="02020500000000000000" pitchFamily="18" charset="-120"/>
+                        </a:rPr>
+                        <a:t>2</a:t>
+                      </a:r>
+                      <a:endParaRPr lang="en-US" altLang="zh-TW" sz="1200" b="1" i="0" u="none" strike="noStrike" dirty="0">
+                        <a:solidFill>
+                          <a:srgbClr val="000000"/>
+                        </a:solidFill>
+                        <a:effectLst/>
+                        <a:latin typeface="+mn-lt"/>
+                        <a:ea typeface="新細明體" panose="02020500000000000000" pitchFamily="18" charset="-120"/>
+                      </a:endParaRPr>
+                    </a:p>
+                  </a:txBody>
+                  <a:tcPr marL="9525" marR="9525" marT="9525" marB="0" anchor="ctr">
+                    <a:lnT w="12700" cap="flat" cmpd="sng" algn="ctr">
+                      <a:solidFill>
+                        <a:schemeClr val="tx1"/>
+                      </a:solidFill>
+                      <a:prstDash val="solid"/>
+                      <a:round/>
+                      <a:headEnd type="none" w="med" len="med"/>
+                      <a:tailEnd type="none" w="med" len="med"/>
+                    </a:lnT>
+                    <a:lnB w="12700" cap="flat" cmpd="sng" algn="ctr">
+                      <a:solidFill>
+                        <a:schemeClr val="tx1"/>
+                      </a:solidFill>
+                      <a:prstDash val="solid"/>
+                      <a:round/>
+                      <a:headEnd type="none" w="med" len="med"/>
+                      <a:tailEnd type="none" w="med" len="med"/>
+                    </a:lnB>
+                  </a:tcPr>
+                </a:tc>
+                <a:tc>
+                  <a:txBody>
+                    <a:bodyPr/>
+                    <a:lstStyle/>
+                    <a:p>
+                      <a:pPr marL="0" marR="0" lvl="0" indent="0" algn="ctr" defTabSz="914400" rtl="0" eaLnBrk="1" fontAlgn="ctr" latinLnBrk="0" hangingPunct="1">
+                        <a:lnSpc>
+                          <a:spcPct val="100000"/>
+                        </a:lnSpc>
+                        <a:spcBef>
+                          <a:spcPts val="0"/>
+                        </a:spcBef>
+                        <a:spcAft>
+                          <a:spcPts val="0"/>
+                        </a:spcAft>
+                        <a:buClrTx/>
+                        <a:buSzTx/>
+                        <a:buFontTx/>
+                        <a:buNone/>
+                        <a:tabLst/>
+                        <a:defRPr/>
+                      </a:pPr>
+                      <a:r>
+                        <a:rPr lang="en-US" altLang="zh-TW" sz="1200" b="1" u="none" strike="noStrike" dirty="0">
+                          <a:solidFill>
+                            <a:srgbClr val="000000"/>
+                          </a:solidFill>
+                          <a:effectLst/>
+                          <a:latin typeface="+mn-lt"/>
+                        </a:rPr>
+                        <a:t>BiGRUWithAttention</a:t>
+                      </a:r>
+                    </a:p>
+                    <a:p>
+                      <a:pPr algn="ctr" fontAlgn="ctr"/>
+                      <a:r>
+                        <a:rPr lang="pt-BR" altLang="zh-TW" sz="1200" b="1" u="none" strike="noStrike" dirty="0">
+                          <a:solidFill>
+                            <a:srgbClr val="000000"/>
+                          </a:solidFill>
+                          <a:effectLst/>
+                          <a:latin typeface="+mn-lt"/>
+                        </a:rPr>
+                        <a:t>(num_layers=4, lora_r=4, alpha=0.1)</a:t>
+                      </a:r>
+                    </a:p>
+                    <a:p>
+                      <a:pPr algn="ctr" fontAlgn="ctr"/>
+                      <a:r>
+                        <a:rPr lang="en-US" altLang="zh-TW" sz="1200" b="1" u="none" strike="noStrike" dirty="0">
+                          <a:solidFill>
+                            <a:srgbClr val="000000"/>
+                          </a:solidFill>
+                          <a:effectLst/>
+                          <a:latin typeface="+mn-lt"/>
+                        </a:rPr>
+                        <a:t>'LoRA_v8/Rank_4_Period_2/alpha_0.1'</a:t>
+                      </a:r>
+                      <a:endParaRPr lang="en-US" altLang="zh-TW" sz="1200" b="1" i="0" u="none" strike="noStrike" dirty="0">
+                        <a:solidFill>
+                          <a:srgbClr val="000000"/>
+                        </a:solidFill>
+                        <a:effectLst/>
+                        <a:latin typeface="+mn-lt"/>
+                        <a:ea typeface="+mn-ea"/>
+                      </a:endParaRPr>
+                    </a:p>
+                  </a:txBody>
+                  <a:tcPr marL="9525" marR="9525" marT="9525" marB="0" anchor="ctr">
+                    <a:lnT w="12700" cap="flat" cmpd="sng" algn="ctr">
+                      <a:solidFill>
+                        <a:schemeClr val="tx1"/>
+                      </a:solidFill>
+                      <a:prstDash val="solid"/>
+                      <a:round/>
+                      <a:headEnd type="none" w="med" len="med"/>
+                      <a:tailEnd type="none" w="med" len="med"/>
+                    </a:lnT>
+                    <a:lnB w="12700" cap="flat" cmpd="sng" algn="ctr">
+                      <a:solidFill>
+                        <a:schemeClr val="tx1"/>
+                      </a:solidFill>
+                      <a:prstDash val="solid"/>
+                      <a:round/>
+                      <a:headEnd type="none" w="med" len="med"/>
+                      <a:tailEnd type="none" w="med" len="med"/>
+                    </a:lnB>
+                  </a:tcPr>
+                </a:tc>
+                <a:tc>
+                  <a:txBody>
+                    <a:bodyPr/>
+                    <a:lstStyle/>
+                    <a:p>
+                      <a:pPr algn="ctr"/>
+                      <a:r>
+                        <a:rPr lang="en-US" altLang="zh-TW" sz="1200" b="1" kern="1200" dirty="0">
+                          <a:solidFill>
+                            <a:schemeClr val="tx1"/>
+                          </a:solidFill>
+                          <a:effectLst/>
+                          <a:latin typeface="+mn-lt"/>
+                          <a:ea typeface="+mn-ea"/>
+                          <a:cs typeface="+mn-cs"/>
+                        </a:rPr>
+                        <a:t>96.43</a:t>
+                      </a:r>
+                      <a:endParaRPr lang="zh-TW" altLang="en-US" sz="1200" b="1" kern="1200" dirty="0">
+                        <a:solidFill>
+                          <a:schemeClr val="tx1"/>
+                        </a:solidFill>
+                        <a:effectLst/>
+                        <a:latin typeface="+mn-lt"/>
+                        <a:ea typeface="+mn-ea"/>
+                        <a:cs typeface="+mn-cs"/>
+                      </a:endParaRPr>
+                    </a:p>
+                  </a:txBody>
+                  <a:tcPr marL="9525" marR="9525" marT="9525" marB="0" anchor="ctr">
+                    <a:lnT w="12700" cap="flat" cmpd="sng" algn="ctr">
+                      <a:solidFill>
+                        <a:schemeClr val="tx1"/>
+                      </a:solidFill>
+                      <a:prstDash val="solid"/>
+                      <a:round/>
+                      <a:headEnd type="none" w="med" len="med"/>
+                      <a:tailEnd type="none" w="med" len="med"/>
+                    </a:lnT>
+                    <a:lnB w="12700" cap="flat" cmpd="sng" algn="ctr">
+                      <a:solidFill>
+                        <a:schemeClr val="tx1"/>
+                      </a:solidFill>
+                      <a:prstDash val="solid"/>
+                      <a:round/>
+                      <a:headEnd type="none" w="med" len="med"/>
+                      <a:tailEnd type="none" w="med" len="med"/>
+                    </a:lnB>
+                  </a:tcPr>
+                </a:tc>
+                <a:tc>
+                  <a:txBody>
+                    <a:bodyPr/>
+                    <a:lstStyle/>
+                    <a:p>
+                      <a:pPr algn="l"/>
+                      <a:r>
+                        <a:rPr lang="en-US" altLang="zh-TW" sz="1200" b="1" kern="1200" dirty="0">
+                          <a:solidFill>
+                            <a:schemeClr val="tx1"/>
+                          </a:solidFill>
+                          <a:effectLst/>
+                          <a:latin typeface="+mn-lt"/>
+                          <a:ea typeface="+mn-ea"/>
+                          <a:cs typeface="+mn-cs"/>
+                        </a:rPr>
+                        <a:t>{0: 98.93%, 1: 95.63%, 2: 87.04%} </a:t>
+                      </a:r>
+                      <a:endParaRPr lang="zh-TW" altLang="en-US" sz="1200" b="1" kern="1200" dirty="0">
+                        <a:solidFill>
+                          <a:schemeClr val="tx1"/>
+                        </a:solidFill>
+                        <a:effectLst/>
+                        <a:latin typeface="+mn-lt"/>
+                        <a:ea typeface="+mn-ea"/>
+                        <a:cs typeface="+mn-cs"/>
+                      </a:endParaRPr>
+                    </a:p>
+                  </a:txBody>
+                  <a:tcPr marL="9525" marR="9525" marT="9525" marB="0" anchor="ctr">
+                    <a:lnT w="12700" cap="flat" cmpd="sng" algn="ctr">
+                      <a:solidFill>
+                        <a:schemeClr val="tx1"/>
+                      </a:solidFill>
+                      <a:prstDash val="solid"/>
+                      <a:round/>
+                      <a:headEnd type="none" w="med" len="med"/>
+                      <a:tailEnd type="none" w="med" len="med"/>
+                    </a:lnT>
+                    <a:lnB w="12700" cap="flat" cmpd="sng" algn="ctr">
+                      <a:solidFill>
+                        <a:schemeClr val="tx1"/>
+                      </a:solidFill>
+                      <a:prstDash val="solid"/>
+                      <a:round/>
+                      <a:headEnd type="none" w="med" len="med"/>
+                      <a:tailEnd type="none" w="med" len="med"/>
+                    </a:lnB>
+                  </a:tcPr>
+                </a:tc>
+                <a:extLst>
+                  <a:ext uri="{0D108BD9-81ED-4DB2-BD59-A6C34878D82A}">
+                    <a16:rowId xmlns:a16="http://schemas.microsoft.com/office/drawing/2014/main" val="2106950084"/>
+                  </a:ext>
+                </a:extLst>
+              </a:tr>
+              <a:tr h="209550">
+                <a:tc>
+                  <a:txBody>
+                    <a:bodyPr/>
+                    <a:lstStyle/>
+                    <a:p>
+                      <a:pPr algn="ctr" fontAlgn="ctr"/>
+                      <a:r>
+                        <a:rPr lang="en-US" altLang="zh-TW" sz="1200" b="1" u="none" strike="noStrike">
+                          <a:solidFill>
+                            <a:srgbClr val="000000"/>
+                          </a:solidFill>
+                          <a:effectLst/>
+                          <a:latin typeface="+mn-lt"/>
+                        </a:rPr>
+                        <a:t>3</a:t>
+                      </a:r>
+                      <a:endParaRPr lang="en-US" altLang="zh-TW" sz="1200" b="1" i="0" u="none" strike="noStrike" dirty="0">
+                        <a:solidFill>
+                          <a:srgbClr val="000000"/>
+                        </a:solidFill>
+                        <a:effectLst/>
+                        <a:latin typeface="+mn-lt"/>
+                        <a:ea typeface="新細明體" panose="02020500000000000000" pitchFamily="18" charset="-120"/>
+                      </a:endParaRPr>
+                    </a:p>
+                  </a:txBody>
+                  <a:tcPr marL="9525" marR="9525" marT="9525" marB="0" anchor="ctr">
+                    <a:lnT w="12700" cap="flat" cmpd="sng" algn="ctr">
+                      <a:solidFill>
+                        <a:schemeClr val="tx1"/>
+                      </a:solidFill>
+                      <a:prstDash val="solid"/>
+                      <a:round/>
+                      <a:headEnd type="none" w="med" len="med"/>
+                      <a:tailEnd type="none" w="med" len="med"/>
+                    </a:lnT>
+                    <a:lnB w="12700" cap="flat" cmpd="sng" algn="ctr">
+                      <a:solidFill>
+                        <a:schemeClr val="tx1"/>
+                      </a:solidFill>
+                      <a:prstDash val="solid"/>
+                      <a:round/>
+                      <a:headEnd type="none" w="med" len="med"/>
+                      <a:tailEnd type="none" w="med" len="med"/>
+                    </a:lnB>
+                  </a:tcPr>
+                </a:tc>
+                <a:tc>
+                  <a:txBody>
+                    <a:bodyPr/>
+                    <a:lstStyle/>
+                    <a:p>
+                      <a:pPr marL="0" marR="0" lvl="0" indent="0" algn="ctr" defTabSz="914400" rtl="0" eaLnBrk="1" fontAlgn="ctr" latinLnBrk="0" hangingPunct="1">
+                        <a:lnSpc>
+                          <a:spcPct val="100000"/>
+                        </a:lnSpc>
+                        <a:spcBef>
+                          <a:spcPts val="0"/>
+                        </a:spcBef>
+                        <a:spcAft>
+                          <a:spcPts val="0"/>
+                        </a:spcAft>
+                        <a:buClrTx/>
+                        <a:buSzTx/>
+                        <a:buFontTx/>
+                        <a:buNone/>
+                        <a:tabLst/>
+                        <a:defRPr/>
+                      </a:pPr>
+                      <a:r>
+                        <a:rPr lang="en-US" altLang="zh-TW" sz="1200" b="1" u="none" strike="noStrike" dirty="0">
+                          <a:solidFill>
+                            <a:srgbClr val="000000"/>
+                          </a:solidFill>
+                          <a:effectLst/>
+                          <a:latin typeface="+mn-lt"/>
+                        </a:rPr>
+                        <a:t>BiGRUWithAttention</a:t>
+                      </a:r>
+                      <a:endParaRPr kumimoji="0" lang="en-US" altLang="zh-TW" sz="1200" b="1" i="0" u="none" strike="noStrike" kern="1200" cap="none" spc="0" normalizeH="0" baseline="0" noProof="0" dirty="0">
+                        <a:ln>
+                          <a:noFill/>
+                        </a:ln>
+                        <a:solidFill>
+                          <a:srgbClr val="000000"/>
+                        </a:solidFill>
+                        <a:effectLst/>
+                        <a:uLnTx/>
+                        <a:uFillTx/>
+                        <a:latin typeface="Calibri" panose="020F0502020204030204"/>
+                        <a:ea typeface="新細明體" panose="02020500000000000000" pitchFamily="18" charset="-120"/>
+                        <a:cs typeface="+mn-cs"/>
+                      </a:endParaRPr>
+                    </a:p>
+                    <a:p>
+                      <a:pPr marL="0" marR="0" lvl="0" indent="0" algn="ctr" defTabSz="914400" rtl="0" eaLnBrk="1" fontAlgn="ctr" latinLnBrk="0" hangingPunct="1">
+                        <a:lnSpc>
+                          <a:spcPct val="100000"/>
+                        </a:lnSpc>
+                        <a:spcBef>
+                          <a:spcPts val="0"/>
+                        </a:spcBef>
+                        <a:spcAft>
+                          <a:spcPts val="0"/>
+                        </a:spcAft>
+                        <a:buClrTx/>
+                        <a:buSzTx/>
+                        <a:buFontTx/>
+                        <a:buNone/>
+                        <a:tabLst/>
+                        <a:defRPr/>
+                      </a:pPr>
+                      <a:r>
+                        <a:rPr kumimoji="0" lang="pt-BR" altLang="zh-TW" sz="1200" b="1" i="0" u="none" strike="noStrike" kern="1200" cap="none" spc="0" normalizeH="0" baseline="0" noProof="0" dirty="0">
+                          <a:ln>
+                            <a:noFill/>
+                          </a:ln>
+                          <a:solidFill>
+                            <a:srgbClr val="000000"/>
+                          </a:solidFill>
+                          <a:effectLst/>
+                          <a:uLnTx/>
+                          <a:uFillTx/>
+                          <a:latin typeface="+mn-lt"/>
+                          <a:ea typeface="+mn-ea"/>
+                          <a:cs typeface="+mn-cs"/>
+                        </a:rPr>
+                        <a:t>(num_layers=4, lora_r=4, alpha=0.1)</a:t>
+                      </a:r>
+                    </a:p>
+                    <a:p>
+                      <a:pPr marL="0" marR="0" lvl="0" indent="0" algn="ctr" defTabSz="914400" rtl="0" eaLnBrk="1" fontAlgn="ctr" latinLnBrk="0" hangingPunct="1">
+                        <a:lnSpc>
+                          <a:spcPct val="100000"/>
+                        </a:lnSpc>
+                        <a:spcBef>
+                          <a:spcPts val="0"/>
+                        </a:spcBef>
+                        <a:spcAft>
+                          <a:spcPts val="0"/>
+                        </a:spcAft>
+                        <a:buClrTx/>
+                        <a:buSzTx/>
+                        <a:buFontTx/>
+                        <a:buNone/>
+                        <a:tabLst/>
+                        <a:defRPr/>
+                      </a:pPr>
+                      <a:r>
+                        <a:rPr kumimoji="0" lang="en-US" altLang="zh-TW" sz="1200" b="1" i="0" u="none" strike="noStrike" kern="1200" cap="none" spc="0" normalizeH="0" baseline="0" noProof="0" dirty="0">
+                          <a:ln>
+                            <a:noFill/>
+                          </a:ln>
+                          <a:solidFill>
+                            <a:srgbClr val="000000"/>
+                          </a:solidFill>
+                          <a:effectLst/>
+                          <a:uLnTx/>
+                          <a:uFillTx/>
+                          <a:latin typeface="+mn-lt"/>
+                          <a:ea typeface="+mn-ea"/>
+                          <a:cs typeface="+mn-cs"/>
+                        </a:rPr>
+                        <a:t>'LoRA_v8/Rank_4_Period_3/alpha_0.1'</a:t>
+                      </a:r>
+                      <a:endParaRPr kumimoji="0" lang="en-US" altLang="zh-TW" sz="1200" b="1" i="0" u="none" strike="noStrike" kern="1200" cap="none" spc="0" normalizeH="0" baseline="0" noProof="0" dirty="0">
+                        <a:ln>
+                          <a:noFill/>
+                        </a:ln>
+                        <a:solidFill>
+                          <a:srgbClr val="000000"/>
+                        </a:solidFill>
+                        <a:effectLst/>
+                        <a:uLnTx/>
+                        <a:uFillTx/>
+                        <a:latin typeface="Calibri" panose="020F0502020204030204"/>
+                        <a:ea typeface="新細明體" panose="02020500000000000000" pitchFamily="18" charset="-120"/>
+                        <a:cs typeface="+mn-cs"/>
+                      </a:endParaRPr>
+                    </a:p>
+                  </a:txBody>
+                  <a:tcPr marL="9525" marR="9525" marT="9525" marB="0" anchor="ctr">
+                    <a:lnT w="12700" cap="flat" cmpd="sng" algn="ctr">
+                      <a:solidFill>
+                        <a:schemeClr val="tx1"/>
+                      </a:solidFill>
+                      <a:prstDash val="solid"/>
+                      <a:round/>
+                      <a:headEnd type="none" w="med" len="med"/>
+                      <a:tailEnd type="none" w="med" len="med"/>
+                    </a:lnT>
+                    <a:lnB w="12700" cap="flat" cmpd="sng" algn="ctr">
+                      <a:solidFill>
+                        <a:schemeClr val="tx1"/>
+                      </a:solidFill>
+                      <a:prstDash val="solid"/>
+                      <a:round/>
+                      <a:headEnd type="none" w="med" len="med"/>
+                      <a:tailEnd type="none" w="med" len="med"/>
+                    </a:lnB>
+                  </a:tcPr>
+                </a:tc>
+                <a:tc>
+                  <a:txBody>
+                    <a:bodyPr/>
+                    <a:lstStyle/>
+                    <a:p>
+                      <a:pPr marL="0" marR="0" lvl="0" indent="0" algn="ctr" defTabSz="914400" rtl="0" eaLnBrk="1" fontAlgn="ctr" latinLnBrk="0" hangingPunct="1">
+                        <a:lnSpc>
+                          <a:spcPct val="100000"/>
+                        </a:lnSpc>
+                        <a:spcBef>
+                          <a:spcPts val="0"/>
+                        </a:spcBef>
+                        <a:spcAft>
+                          <a:spcPts val="0"/>
+                        </a:spcAft>
+                        <a:buClrTx/>
+                        <a:buSzTx/>
+                        <a:buFontTx/>
+                        <a:buNone/>
+                        <a:tabLst/>
+                        <a:defRPr/>
+                      </a:pPr>
+                      <a:r>
+                        <a:rPr lang="en-US" altLang="zh-TW" sz="1200" b="1" kern="1200" dirty="0">
+                          <a:solidFill>
+                            <a:schemeClr val="tx1"/>
+                          </a:solidFill>
+                          <a:effectLst/>
+                          <a:latin typeface="+mn-lt"/>
+                          <a:ea typeface="+mn-ea"/>
+                          <a:cs typeface="+mn-cs"/>
+                        </a:rPr>
+                        <a:t>91.14</a:t>
+                      </a:r>
+                      <a:endParaRPr lang="zh-TW" altLang="en-US" sz="1200" b="1" kern="1200" dirty="0">
+                        <a:solidFill>
+                          <a:schemeClr val="tx1"/>
+                        </a:solidFill>
+                        <a:effectLst/>
+                        <a:latin typeface="+mn-lt"/>
+                        <a:ea typeface="+mn-ea"/>
+                        <a:cs typeface="+mn-cs"/>
+                      </a:endParaRPr>
+                    </a:p>
+                  </a:txBody>
+                  <a:tcPr marL="9525" marR="9525" marT="9525" marB="0" anchor="ctr">
+                    <a:lnT w="12700" cap="flat" cmpd="sng" algn="ctr">
+                      <a:solidFill>
+                        <a:schemeClr val="tx1"/>
+                      </a:solidFill>
+                      <a:prstDash val="solid"/>
+                      <a:round/>
+                      <a:headEnd type="none" w="med" len="med"/>
+                      <a:tailEnd type="none" w="med" len="med"/>
+                    </a:lnT>
+                    <a:lnB w="12700" cap="flat" cmpd="sng" algn="ctr">
+                      <a:solidFill>
+                        <a:schemeClr val="tx1"/>
+                      </a:solidFill>
+                      <a:prstDash val="solid"/>
+                      <a:round/>
+                      <a:headEnd type="none" w="med" len="med"/>
+                      <a:tailEnd type="none" w="med" len="med"/>
+                    </a:lnB>
+                  </a:tcPr>
+                </a:tc>
+                <a:tc>
+                  <a:txBody>
+                    <a:bodyPr/>
+                    <a:lstStyle/>
+                    <a:p>
+                      <a:pPr algn="l"/>
+                      <a:r>
+                        <a:rPr lang="en-US" altLang="zh-TW" sz="1200" b="1" kern="1200" dirty="0">
+                          <a:solidFill>
+                            <a:schemeClr val="tx1"/>
+                          </a:solidFill>
+                          <a:effectLst/>
+                          <a:latin typeface="+mn-lt"/>
+                          <a:ea typeface="+mn-ea"/>
+                          <a:cs typeface="+mn-cs"/>
+                        </a:rPr>
+                        <a:t>{0: 50.14%, 1: 97.60%, 2: 90.57%, 3: 94.29%} </a:t>
+                      </a:r>
+                      <a:endParaRPr lang="zh-TW" altLang="en-US" sz="1200" b="1" kern="1200" dirty="0">
+                        <a:solidFill>
+                          <a:schemeClr val="tx1"/>
+                        </a:solidFill>
+                        <a:effectLst/>
+                        <a:latin typeface="+mn-lt"/>
+                        <a:ea typeface="+mn-ea"/>
+                        <a:cs typeface="+mn-cs"/>
+                      </a:endParaRPr>
+                    </a:p>
+                  </a:txBody>
+                  <a:tcPr marL="9525" marR="9525" marT="9525" marB="0" anchor="ctr">
+                    <a:lnT w="12700" cap="flat" cmpd="sng" algn="ctr">
+                      <a:solidFill>
+                        <a:schemeClr val="tx1"/>
+                      </a:solidFill>
+                      <a:prstDash val="solid"/>
+                      <a:round/>
+                      <a:headEnd type="none" w="med" len="med"/>
+                      <a:tailEnd type="none" w="med" len="med"/>
+                    </a:lnT>
+                    <a:lnB w="12700" cap="flat" cmpd="sng" algn="ctr">
+                      <a:solidFill>
+                        <a:schemeClr val="tx1"/>
+                      </a:solidFill>
+                      <a:prstDash val="solid"/>
+                      <a:round/>
+                      <a:headEnd type="none" w="med" len="med"/>
+                      <a:tailEnd type="none" w="med" len="med"/>
+                    </a:lnB>
+                  </a:tcPr>
+                </a:tc>
+                <a:extLst>
+                  <a:ext uri="{0D108BD9-81ED-4DB2-BD59-A6C34878D82A}">
+                    <a16:rowId xmlns:a16="http://schemas.microsoft.com/office/drawing/2014/main" val="3093903797"/>
+                  </a:ext>
+                </a:extLst>
+              </a:tr>
+              <a:tr h="209550">
+                <a:tc>
+                  <a:txBody>
+                    <a:bodyPr/>
+                    <a:lstStyle/>
+                    <a:p>
+                      <a:pPr algn="ctr" fontAlgn="ctr"/>
+                      <a:r>
+                        <a:rPr lang="en-US" altLang="zh-TW" sz="1200" b="1" u="none" strike="noStrike">
+                          <a:solidFill>
+                            <a:srgbClr val="000000"/>
+                          </a:solidFill>
+                          <a:effectLst/>
+                          <a:latin typeface="+mn-lt"/>
+                        </a:rPr>
+                        <a:t>4</a:t>
+                      </a:r>
+                      <a:endParaRPr lang="en-US" altLang="zh-TW" sz="1200" b="1" i="0" u="none" strike="noStrike" dirty="0">
+                        <a:solidFill>
+                          <a:srgbClr val="000000"/>
+                        </a:solidFill>
+                        <a:effectLst/>
+                        <a:latin typeface="+mn-lt"/>
+                        <a:ea typeface="新細明體" panose="02020500000000000000" pitchFamily="18" charset="-120"/>
+                      </a:endParaRPr>
+                    </a:p>
+                  </a:txBody>
+                  <a:tcPr marL="9525" marR="9525" marT="9525" marB="0" anchor="ctr">
+                    <a:lnT w="12700" cap="flat" cmpd="sng" algn="ctr">
+                      <a:solidFill>
+                        <a:schemeClr val="tx1"/>
+                      </a:solidFill>
+                      <a:prstDash val="solid"/>
+                      <a:round/>
+                      <a:headEnd type="none" w="med" len="med"/>
+                      <a:tailEnd type="none" w="med" len="med"/>
+                    </a:lnT>
+                    <a:lnB w="12700" cap="flat" cmpd="sng" algn="ctr">
+                      <a:solidFill>
+                        <a:schemeClr val="tx1"/>
+                      </a:solidFill>
+                      <a:prstDash val="solid"/>
+                      <a:round/>
+                      <a:headEnd type="none" w="med" len="med"/>
+                      <a:tailEnd type="none" w="med" len="med"/>
+                    </a:lnB>
+                  </a:tcPr>
+                </a:tc>
+                <a:tc>
+                  <a:txBody>
+                    <a:bodyPr/>
+                    <a:lstStyle/>
+                    <a:p>
+                      <a:pPr marL="0" marR="0" lvl="0" indent="0" algn="ctr" defTabSz="914400" rtl="0" eaLnBrk="1" fontAlgn="ctr" latinLnBrk="0" hangingPunct="1">
+                        <a:lnSpc>
+                          <a:spcPct val="100000"/>
+                        </a:lnSpc>
+                        <a:spcBef>
+                          <a:spcPts val="0"/>
+                        </a:spcBef>
+                        <a:spcAft>
+                          <a:spcPts val="0"/>
+                        </a:spcAft>
+                        <a:buClrTx/>
+                        <a:buSzTx/>
+                        <a:buFontTx/>
+                        <a:buNone/>
+                        <a:tabLst/>
+                        <a:defRPr/>
+                      </a:pPr>
+                      <a:r>
+                        <a:rPr lang="en-US" altLang="zh-TW" sz="1200" b="1" u="none" strike="noStrike" dirty="0">
+                          <a:solidFill>
+                            <a:srgbClr val="000000"/>
+                          </a:solidFill>
+                          <a:effectLst/>
+                          <a:latin typeface="+mn-lt"/>
+                        </a:rPr>
+                        <a:t>BiGRUWithAttention</a:t>
+                      </a:r>
+                      <a:endParaRPr kumimoji="0" lang="en-US" altLang="zh-TW" sz="1200" b="1" i="0" u="none" strike="noStrike" kern="1200" cap="none" spc="0" normalizeH="0" baseline="0" noProof="0" dirty="0">
+                        <a:ln>
+                          <a:noFill/>
+                        </a:ln>
+                        <a:solidFill>
+                          <a:srgbClr val="000000"/>
+                        </a:solidFill>
+                        <a:effectLst/>
+                        <a:uLnTx/>
+                        <a:uFillTx/>
+                        <a:latin typeface="Calibri" panose="020F0502020204030204"/>
+                        <a:ea typeface="新細明體" panose="02020500000000000000" pitchFamily="18" charset="-120"/>
+                        <a:cs typeface="+mn-cs"/>
+                      </a:endParaRPr>
+                    </a:p>
+                    <a:p>
+                      <a:pPr marL="0" marR="0" lvl="0" indent="0" algn="ctr" defTabSz="914400" rtl="0" eaLnBrk="1" fontAlgn="ctr" latinLnBrk="0" hangingPunct="1">
+                        <a:lnSpc>
+                          <a:spcPct val="100000"/>
+                        </a:lnSpc>
+                        <a:spcBef>
+                          <a:spcPts val="0"/>
+                        </a:spcBef>
+                        <a:spcAft>
+                          <a:spcPts val="0"/>
+                        </a:spcAft>
+                        <a:buClrTx/>
+                        <a:buSzTx/>
+                        <a:buFontTx/>
+                        <a:buNone/>
+                        <a:tabLst/>
+                        <a:defRPr/>
+                      </a:pPr>
+                      <a:r>
+                        <a:rPr kumimoji="0" lang="pt-BR" altLang="zh-TW" sz="1200" b="1" i="0" u="none" strike="noStrike" kern="1200" cap="none" spc="0" normalizeH="0" baseline="0" noProof="0" dirty="0">
+                          <a:ln>
+                            <a:noFill/>
+                          </a:ln>
+                          <a:solidFill>
+                            <a:srgbClr val="000000"/>
+                          </a:solidFill>
+                          <a:effectLst/>
+                          <a:uLnTx/>
+                          <a:uFillTx/>
+                          <a:latin typeface="+mn-lt"/>
+                          <a:ea typeface="+mn-ea"/>
+                          <a:cs typeface="+mn-cs"/>
+                        </a:rPr>
+                        <a:t>(num_layers=4, lora_r=4, alpha=0.1)</a:t>
+                      </a:r>
+                    </a:p>
+                    <a:p>
+                      <a:pPr marL="0" marR="0" lvl="0" indent="0" algn="ctr" defTabSz="914400" rtl="0" eaLnBrk="1" fontAlgn="ctr" latinLnBrk="0" hangingPunct="1">
+                        <a:lnSpc>
+                          <a:spcPct val="100000"/>
+                        </a:lnSpc>
+                        <a:spcBef>
+                          <a:spcPts val="0"/>
+                        </a:spcBef>
+                        <a:spcAft>
+                          <a:spcPts val="0"/>
+                        </a:spcAft>
+                        <a:buClrTx/>
+                        <a:buSzTx/>
+                        <a:buFontTx/>
+                        <a:buNone/>
+                        <a:tabLst/>
+                        <a:defRPr/>
+                      </a:pPr>
+                      <a:r>
+                        <a:rPr kumimoji="0" lang="en-US" altLang="zh-TW" sz="1200" b="1" i="0" u="none" strike="noStrike" kern="1200" cap="none" spc="0" normalizeH="0" baseline="0" noProof="0" dirty="0">
+                          <a:ln>
+                            <a:noFill/>
+                          </a:ln>
+                          <a:solidFill>
+                            <a:srgbClr val="000000"/>
+                          </a:solidFill>
+                          <a:effectLst/>
+                          <a:uLnTx/>
+                          <a:uFillTx/>
+                          <a:latin typeface="+mn-lt"/>
+                          <a:ea typeface="+mn-ea"/>
+                          <a:cs typeface="+mn-cs"/>
+                        </a:rPr>
+                        <a:t>'LoRA_v8/Rank_4_Period_4/alpha_0.1'</a:t>
+                      </a:r>
+                      <a:endParaRPr kumimoji="0" lang="en-US" altLang="zh-TW" sz="1200" b="1" i="0" u="none" strike="noStrike" kern="1200" cap="none" spc="0" normalizeH="0" baseline="0" noProof="0" dirty="0">
+                        <a:ln>
+                          <a:noFill/>
+                        </a:ln>
+                        <a:solidFill>
+                          <a:srgbClr val="000000"/>
+                        </a:solidFill>
+                        <a:effectLst/>
+                        <a:uLnTx/>
+                        <a:uFillTx/>
+                        <a:latin typeface="Calibri" panose="020F0502020204030204"/>
+                        <a:ea typeface="新細明體" panose="02020500000000000000" pitchFamily="18" charset="-120"/>
+                        <a:cs typeface="+mn-cs"/>
+                      </a:endParaRPr>
+                    </a:p>
+                  </a:txBody>
+                  <a:tcPr marL="9525" marR="9525" marT="9525" marB="0" anchor="ctr">
+                    <a:lnT w="12700" cap="flat" cmpd="sng" algn="ctr">
+                      <a:solidFill>
+                        <a:schemeClr val="tx1"/>
+                      </a:solidFill>
+                      <a:prstDash val="solid"/>
+                      <a:round/>
+                      <a:headEnd type="none" w="med" len="med"/>
+                      <a:tailEnd type="none" w="med" len="med"/>
+                    </a:lnT>
+                    <a:lnB w="12700" cap="flat" cmpd="sng" algn="ctr">
+                      <a:solidFill>
+                        <a:schemeClr val="tx1"/>
+                      </a:solidFill>
+                      <a:prstDash val="solid"/>
+                      <a:round/>
+                      <a:headEnd type="none" w="med" len="med"/>
+                      <a:tailEnd type="none" w="med" len="med"/>
+                    </a:lnB>
+                  </a:tcPr>
+                </a:tc>
+                <a:tc>
+                  <a:txBody>
+                    <a:bodyPr/>
+                    <a:lstStyle/>
+                    <a:p>
+                      <a:pPr marL="0" marR="0" lvl="0" indent="0" algn="ctr" defTabSz="914400" rtl="0" eaLnBrk="1" fontAlgn="ctr" latinLnBrk="0" hangingPunct="1">
+                        <a:lnSpc>
+                          <a:spcPct val="100000"/>
+                        </a:lnSpc>
+                        <a:spcBef>
+                          <a:spcPts val="0"/>
+                        </a:spcBef>
+                        <a:spcAft>
+                          <a:spcPts val="0"/>
+                        </a:spcAft>
+                        <a:buClrTx/>
+                        <a:buSzTx/>
+                        <a:buFontTx/>
+                        <a:buNone/>
+                        <a:tabLst/>
+                        <a:defRPr/>
+                      </a:pPr>
+                      <a:r>
+                        <a:rPr lang="en-US" altLang="zh-TW" sz="1200" b="1" kern="1200" dirty="0">
+                          <a:solidFill>
+                            <a:schemeClr val="tx1"/>
+                          </a:solidFill>
+                          <a:effectLst/>
+                          <a:latin typeface="+mn-lt"/>
+                          <a:ea typeface="+mn-ea"/>
+                          <a:cs typeface="+mn-cs"/>
+                        </a:rPr>
+                        <a:t>88.21</a:t>
+                      </a:r>
+                      <a:endParaRPr lang="zh-TW" altLang="en-US" sz="1200" b="1" kern="1200" dirty="0">
+                        <a:solidFill>
+                          <a:schemeClr val="tx1"/>
+                        </a:solidFill>
+                        <a:effectLst/>
+                        <a:latin typeface="+mn-lt"/>
+                        <a:ea typeface="+mn-ea"/>
+                        <a:cs typeface="+mn-cs"/>
+                      </a:endParaRPr>
+                    </a:p>
+                  </a:txBody>
+                  <a:tcPr marL="9525" marR="9525" marT="9525" marB="0" anchor="ctr">
+                    <a:lnT w="12700" cap="flat" cmpd="sng" algn="ctr">
+                      <a:solidFill>
+                        <a:schemeClr val="tx1"/>
+                      </a:solidFill>
+                      <a:prstDash val="solid"/>
+                      <a:round/>
+                      <a:headEnd type="none" w="med" len="med"/>
+                      <a:tailEnd type="none" w="med" len="med"/>
+                    </a:lnT>
+                    <a:lnB w="12700" cap="flat" cmpd="sng" algn="ctr">
+                      <a:solidFill>
+                        <a:schemeClr val="tx1"/>
+                      </a:solidFill>
+                      <a:prstDash val="solid"/>
+                      <a:round/>
+                      <a:headEnd type="none" w="med" len="med"/>
+                      <a:tailEnd type="none" w="med" len="med"/>
+                    </a:lnB>
+                  </a:tcPr>
+                </a:tc>
+                <a:tc>
+                  <a:txBody>
+                    <a:bodyPr/>
+                    <a:lstStyle/>
+                    <a:p>
+                      <a:pPr marL="0" marR="0" lvl="0" indent="0" algn="l" defTabSz="914400" rtl="0" eaLnBrk="1" fontAlgn="ctr" latinLnBrk="0" hangingPunct="1">
+                        <a:lnSpc>
+                          <a:spcPct val="100000"/>
+                        </a:lnSpc>
+                        <a:spcBef>
+                          <a:spcPts val="0"/>
+                        </a:spcBef>
+                        <a:spcAft>
+                          <a:spcPts val="0"/>
+                        </a:spcAft>
+                        <a:buClrTx/>
+                        <a:buSzTx/>
+                        <a:buFontTx/>
+                        <a:buNone/>
+                        <a:tabLst/>
+                        <a:defRPr/>
+                      </a:pPr>
+                      <a:r>
+                        <a:rPr lang="en-US" altLang="zh-TW" sz="1200" b="1" kern="1200" dirty="0">
+                          <a:solidFill>
+                            <a:schemeClr val="tx1"/>
+                          </a:solidFill>
+                          <a:effectLst/>
+                          <a:latin typeface="+mn-lt"/>
+                          <a:ea typeface="+mn-ea"/>
+                          <a:cs typeface="+mn-cs"/>
+                        </a:rPr>
+                        <a:t>{0: 75.26%, 1: 95.05%, 2: 92.39%, 3: 94.41%, 4: 41.75%}</a:t>
+                      </a:r>
+                      <a:endParaRPr lang="zh-TW" altLang="en-US" sz="1200" b="1" kern="1200" dirty="0">
+                        <a:solidFill>
+                          <a:schemeClr val="tx1"/>
+                        </a:solidFill>
+                        <a:effectLst/>
+                        <a:latin typeface="+mn-lt"/>
+                        <a:ea typeface="+mn-ea"/>
+                        <a:cs typeface="+mn-cs"/>
+                      </a:endParaRPr>
+                    </a:p>
+                  </a:txBody>
+                  <a:tcPr marL="9525" marR="9525" marT="9525" marB="0" anchor="ctr">
+                    <a:lnT w="12700" cap="flat" cmpd="sng" algn="ctr">
+                      <a:solidFill>
+                        <a:schemeClr val="tx1"/>
+                      </a:solidFill>
+                      <a:prstDash val="solid"/>
+                      <a:round/>
+                      <a:headEnd type="none" w="med" len="med"/>
+                      <a:tailEnd type="none" w="med" len="med"/>
+                    </a:lnT>
+                    <a:lnB w="12700" cap="flat" cmpd="sng" algn="ctr">
+                      <a:solidFill>
+                        <a:schemeClr val="tx1"/>
+                      </a:solidFill>
+                      <a:prstDash val="solid"/>
+                      <a:round/>
+                      <a:headEnd type="none" w="med" len="med"/>
+                      <a:tailEnd type="none" w="med" len="med"/>
+                    </a:lnB>
+                  </a:tcPr>
+                </a:tc>
+                <a:extLst>
+                  <a:ext uri="{0D108BD9-81ED-4DB2-BD59-A6C34878D82A}">
+                    <a16:rowId xmlns:a16="http://schemas.microsoft.com/office/drawing/2014/main" val="435917672"/>
+                  </a:ext>
+                </a:extLst>
+              </a:tr>
+            </a:tbl>
+          </a:graphicData>
+        </a:graphic>
+      </p:graphicFrame>
+      <p:sp>
+        <p:nvSpPr>
+          <p:cNvPr id="5" name="文字方塊 4">
+            <a:extLst>
+              <a:ext uri="{FF2B5EF4-FFF2-40B4-BE49-F238E27FC236}">
+                <a16:creationId xmlns:a16="http://schemas.microsoft.com/office/drawing/2014/main" id="{51372776-2537-403D-951C-80FEB73E8279}"/>
+              </a:ext>
+            </a:extLst>
+          </p:cNvPr>
+          <p:cNvSpPr txBox="1"/>
+          <p:nvPr/>
+        </p:nvSpPr>
+        <p:spPr>
+          <a:xfrm>
+            <a:off x="3048699" y="4824412"/>
+            <a:ext cx="6094602" cy="276999"/>
+          </a:xfrm>
+          <a:prstGeom prst="rect">
+            <a:avLst/>
+          </a:prstGeom>
+          <a:noFill/>
+        </p:spPr>
+        <p:txBody>
+          <a:bodyPr wrap="square">
+            <a:spAutoFit/>
+          </a:bodyPr>
+          <a:lstStyle/>
+          <a:p>
+            <a:pPr algn="ctr"/>
+            <a:r>
+              <a:rPr lang="en-US" altLang="zh-TW" sz="1200" b="1" dirty="0">
+                <a:latin typeface="Abadi" panose="020B0604020104020204" pitchFamily="34" charset="0"/>
+              </a:rPr>
+              <a:t>▲</a:t>
+            </a:r>
+            <a:r>
+              <a:rPr lang="en-US" altLang="zh-TW" sz="1200" b="1" dirty="0"/>
+              <a:t> Standard LoRA (BiGRUWithAttention + LoRA)</a:t>
+            </a:r>
+            <a:endParaRPr lang="zh-TW" altLang="en-US" sz="1200" b="1" dirty="0"/>
+          </a:p>
+        </p:txBody>
+      </p:sp>
+      <p:sp>
+        <p:nvSpPr>
+          <p:cNvPr id="7" name="文字方塊 6">
+            <a:extLst>
+              <a:ext uri="{FF2B5EF4-FFF2-40B4-BE49-F238E27FC236}">
+                <a16:creationId xmlns:a16="http://schemas.microsoft.com/office/drawing/2014/main" id="{04B7CC41-FD84-4E1B-A640-D9FF174EB156}"/>
+              </a:ext>
+            </a:extLst>
+          </p:cNvPr>
+          <p:cNvSpPr txBox="1"/>
+          <p:nvPr/>
+        </p:nvSpPr>
+        <p:spPr>
+          <a:xfrm>
+            <a:off x="1152525" y="1570136"/>
+            <a:ext cx="9886950" cy="369332"/>
+          </a:xfrm>
+          <a:prstGeom prst="rect">
+            <a:avLst/>
+          </a:prstGeom>
+          <a:noFill/>
+        </p:spPr>
+        <p:txBody>
+          <a:bodyPr wrap="square">
+            <a:spAutoFit/>
+          </a:bodyPr>
+          <a:lstStyle/>
+          <a:p>
+            <a:pPr algn="ctr"/>
+            <a:r>
+              <a:rPr lang="it-IT" altLang="zh-TW" b="1" dirty="0"/>
+              <a:t>LoRA_CL_Classif_Bi_Dir_GRU_Model_ver2.ipynb</a:t>
+            </a:r>
+            <a:endParaRPr lang="zh-TW" altLang="en-US" b="1" dirty="0"/>
+          </a:p>
+        </p:txBody>
+      </p:sp>
+    </p:spTree>
+    <p:extLst>
+      <p:ext uri="{BB962C8B-B14F-4D97-AF65-F5344CB8AC3E}">
+        <p14:creationId xmlns:p14="http://schemas.microsoft.com/office/powerpoint/2010/main" val="3584928898"/>
       </p:ext>
     </p:extLst>
   </p:cSld>

</xml_diff>